<commit_message>
doc(knitwit-78):adding a cover letter
</commit_message>
<xml_diff>
--- a/documentation/Презентация_KnitWit.pptx
+++ b/documentation/Презентация_KnitWit.pptx
@@ -9138,14 +9138,7 @@
                 <a:latin typeface="Times New Roman" panose="02020603050405020304" pitchFamily="18" charset="0"/>
                 <a:cs typeface="Times New Roman" panose="02020603050405020304" pitchFamily="18" charset="0"/>
               </a:rPr>
-              <a:t>В долгосрочной перспективе поддержка развития платформы будет происходить с помощью добавления платных курсов. Это ускорит процесс разработки и </a:t>
-            </a:r>
-            <a:r>
-              <a:rPr lang="ru-RU" smtClean="0">
-                <a:latin typeface="Times New Roman" panose="02020603050405020304" pitchFamily="18" charset="0"/>
-                <a:cs typeface="Times New Roman" panose="02020603050405020304" pitchFamily="18" charset="0"/>
-              </a:rPr>
-              <a:t>обновления продукта.</a:t>
+              <a:t>В долгосрочной перспективе поддержка развития платформы будет происходить с помощью добавления платных курсов. Это ускорит процесс разработки и обновления продукта.</a:t>
             </a:r>
             <a:endParaRPr lang="ru-RU" dirty="0">
               <a:latin typeface="Times New Roman" panose="02020603050405020304" pitchFamily="18" charset="0"/>
@@ -9384,6 +9377,17 @@
               <a:buNone/>
             </a:pPr>
             <a:r>
+              <a:rPr lang="ru-RU" sz="3000" dirty="0" smtClean="0">
+                <a:solidFill>
+                  <a:schemeClr val="tx1"/>
+                </a:solidFill>
+                <a:effectLst/>
+                <a:latin typeface="Times New Roman" panose="02020603050405020304" pitchFamily="18" charset="0"/>
+                <a:cs typeface="Times New Roman" panose="02020603050405020304" pitchFamily="18" charset="0"/>
+              </a:rPr>
+              <a:t>Добавление </a:t>
+            </a:r>
+            <a:r>
               <a:rPr lang="ru-RU" sz="3000" dirty="0">
                 <a:solidFill>
                   <a:schemeClr val="tx1"/>
@@ -9392,7 +9396,7 @@
                 <a:latin typeface="Times New Roman" panose="02020603050405020304" pitchFamily="18" charset="0"/>
                 <a:cs typeface="Times New Roman" panose="02020603050405020304" pitchFamily="18" charset="0"/>
               </a:rPr>
-              <a:t>Добавления подписки на курсы на платной основе.</a:t>
+              <a:t>подписки на курсы на платной основе.</a:t>
             </a:r>
           </a:p>
           <a:p>

</xml_diff>

<commit_message>
fix: Fixed all docs
</commit_message>
<xml_diff>
--- a/documentation/Презентация_KnitWit.pptx
+++ b/documentation/Презентация_KnitWit.pptx
@@ -1,20 +1,20 @@
 
 <file path=ppt/presentation.xml><?xml version="1.0" encoding="utf-8"?>
-<p:presentation xmlns:a="http://schemas.openxmlformats.org/drawingml/2006/main" xmlns:r="http://schemas.openxmlformats.org/officeDocument/2006/relationships" xmlns:p="http://schemas.openxmlformats.org/presentationml/2006/main" saveSubsetFonts="1">
+<p:presentation xmlns:a="http://schemas.openxmlformats.org/drawingml/2006/main" xmlns:r="http://schemas.openxmlformats.org/officeDocument/2006/relationships" xmlns:p="http://schemas.openxmlformats.org/presentationml/2006/main">
   <p:sldMasterIdLst>
-    <p:sldMasterId id="2147483897" r:id="rId1"/>
+    <p:sldMasterId id="2147483648" r:id="rId1"/>
   </p:sldMasterIdLst>
   <p:sldIdLst>
-    <p:sldId id="256" r:id="rId2"/>
-    <p:sldId id="257" r:id="rId3"/>
-    <p:sldId id="258" r:id="rId4"/>
-    <p:sldId id="259" r:id="rId5"/>
-    <p:sldId id="260" r:id="rId6"/>
-    <p:sldId id="261" r:id="rId7"/>
-    <p:sldId id="262" r:id="rId8"/>
-    <p:sldId id="263" r:id="rId9"/>
-    <p:sldId id="264" r:id="rId10"/>
-    <p:sldId id="265" r:id="rId11"/>
+    <p:sldId id="256" r:id="rId3"/>
+    <p:sldId id="257" r:id="rId4"/>
+    <p:sldId id="258" r:id="rId5"/>
+    <p:sldId id="259" r:id="rId6"/>
+    <p:sldId id="260" r:id="rId7"/>
+    <p:sldId id="261" r:id="rId8"/>
+    <p:sldId id="262" r:id="rId9"/>
+    <p:sldId id="263" r:id="rId10"/>
+    <p:sldId id="264" r:id="rId11"/>
+    <p:sldId id="265" r:id="rId12"/>
   </p:sldIdLst>
   <p:sldSz cx="12192000" cy="6858000"/>
   <p:notesSz cx="6858000" cy="9144000"/>
@@ -113,11 +113,6 @@
       </a:defRPr>
     </a:lvl9pPr>
   </p:defaultTextStyle>
-  <p:extLst>
-    <p:ext uri="{EFAFB233-063F-42B5-8137-9DF3F51BA10A}">
-      <p15:sldGuideLst xmlns:p15="http://schemas.microsoft.com/office/powerpoint/2012/main"/>
-    </p:ext>
-  </p:extLst>
 </p:presentation>
 </file>
 
@@ -306,7 +301,6 @@
           <a:p>
             <a:fld id="{99BDBA1D-B119-4289-857F-3430D9259FA5}" type="datetimeFigureOut">
               <a:rPr lang="ru-RU" smtClean="0"/>
-              <a:t>13.03.2024</a:t>
             </a:fld>
             <a:endParaRPr lang="ru-RU"/>
           </a:p>
@@ -348,18 +342,12 @@
           <a:p>
             <a:fld id="{4F5D964E-5065-4CB3-B1F2-43A3BC32BEED}" type="slidenum">
               <a:rPr lang="ru-RU" smtClean="0"/>
-              <a:t>‹#›</a:t>
             </a:fld>
             <a:endParaRPr lang="ru-RU"/>
           </a:p>
         </p:txBody>
       </p:sp>
     </p:spTree>
-    <p:extLst>
-      <p:ext uri="{BB962C8B-B14F-4D97-AF65-F5344CB8AC3E}">
-        <p14:creationId xmlns:p14="http://schemas.microsoft.com/office/powerpoint/2010/main" val="2761194506"/>
-      </p:ext>
-    </p:extLst>
   </p:cSld>
   <p:clrMapOvr>
     <a:masterClrMapping/>
@@ -584,6 +572,7 @@
               <a:rPr lang="ru-RU"/>
               <a:t>Образец текста</a:t>
             </a:r>
+            <a:endParaRPr lang="ru-RU"/>
           </a:p>
         </p:txBody>
       </p:sp>
@@ -604,7 +593,6 @@
           <a:p>
             <a:fld id="{99BDBA1D-B119-4289-857F-3430D9259FA5}" type="datetimeFigureOut">
               <a:rPr lang="ru-RU" smtClean="0"/>
-              <a:t>13.03.2024</a:t>
             </a:fld>
             <a:endParaRPr lang="ru-RU"/>
           </a:p>
@@ -646,18 +634,12 @@
           <a:p>
             <a:fld id="{4F5D964E-5065-4CB3-B1F2-43A3BC32BEED}" type="slidenum">
               <a:rPr lang="ru-RU" smtClean="0"/>
-              <a:t>‹#›</a:t>
             </a:fld>
             <a:endParaRPr lang="ru-RU"/>
           </a:p>
         </p:txBody>
       </p:sp>
     </p:spTree>
-    <p:extLst>
-      <p:ext uri="{BB962C8B-B14F-4D97-AF65-F5344CB8AC3E}">
-        <p14:creationId xmlns:p14="http://schemas.microsoft.com/office/powerpoint/2010/main" val="1359714201"/>
-      </p:ext>
-    </p:extLst>
   </p:cSld>
   <p:clrMapOvr>
     <a:masterClrMapping/>
@@ -776,6 +758,7 @@
               <a:rPr lang="ru-RU"/>
               <a:t>Образец текста</a:t>
             </a:r>
+            <a:endParaRPr lang="ru-RU"/>
           </a:p>
         </p:txBody>
       </p:sp>
@@ -796,7 +779,6 @@
           <a:p>
             <a:fld id="{99BDBA1D-B119-4289-857F-3430D9259FA5}" type="datetimeFigureOut">
               <a:rPr lang="ru-RU" smtClean="0"/>
-              <a:t>13.03.2024</a:t>
             </a:fld>
             <a:endParaRPr lang="ru-RU"/>
           </a:p>
@@ -838,18 +820,12 @@
           <a:p>
             <a:fld id="{4F5D964E-5065-4CB3-B1F2-43A3BC32BEED}" type="slidenum">
               <a:rPr lang="ru-RU" smtClean="0"/>
-              <a:t>‹#›</a:t>
             </a:fld>
             <a:endParaRPr lang="ru-RU"/>
           </a:p>
         </p:txBody>
       </p:sp>
     </p:spTree>
-    <p:extLst>
-      <p:ext uri="{BB962C8B-B14F-4D97-AF65-F5344CB8AC3E}">
-        <p14:creationId xmlns:p14="http://schemas.microsoft.com/office/powerpoint/2010/main" val="2801698503"/>
-      </p:ext>
-    </p:extLst>
   </p:cSld>
   <p:clrMapOvr>
     <a:masterClrMapping/>
@@ -970,6 +946,7 @@
               <a:rPr lang="ru-RU"/>
               <a:t>Образец текста</a:t>
             </a:r>
+            <a:endParaRPr lang="ru-RU"/>
           </a:p>
         </p:txBody>
       </p:sp>
@@ -1037,6 +1014,7 @@
               <a:rPr lang="ru-RU"/>
               <a:t>Образец текста</a:t>
             </a:r>
+            <a:endParaRPr lang="ru-RU"/>
           </a:p>
         </p:txBody>
       </p:sp>
@@ -1057,7 +1035,6 @@
           <a:p>
             <a:fld id="{99BDBA1D-B119-4289-857F-3430D9259FA5}" type="datetimeFigureOut">
               <a:rPr lang="ru-RU" smtClean="0"/>
-              <a:t>13.03.2024</a:t>
             </a:fld>
             <a:endParaRPr lang="ru-RU"/>
           </a:p>
@@ -1099,7 +1076,6 @@
           <a:p>
             <a:fld id="{4F5D964E-5065-4CB3-B1F2-43A3BC32BEED}" type="slidenum">
               <a:rPr lang="ru-RU" smtClean="0"/>
-              <a:t>‹#›</a:t>
             </a:fld>
             <a:endParaRPr lang="ru-RU"/>
           </a:p>
@@ -1218,6 +1194,12 @@
               </a:rPr>
               <a:t>“</a:t>
             </a:r>
+            <a:endParaRPr lang="en-US" sz="8000" dirty="0">
+              <a:solidFill>
+                <a:schemeClr val="tx1"/>
+              </a:solidFill>
+              <a:effectLst/>
+            </a:endParaRPr>
           </a:p>
         </p:txBody>
       </p:sp>
@@ -1334,15 +1316,16 @@
               </a:rPr>
               <a:t>”</a:t>
             </a:r>
+            <a:endParaRPr lang="en-US" sz="8000" dirty="0">
+              <a:solidFill>
+                <a:schemeClr val="tx1"/>
+              </a:solidFill>
+              <a:effectLst/>
+            </a:endParaRPr>
           </a:p>
         </p:txBody>
       </p:sp>
     </p:spTree>
-    <p:extLst>
-      <p:ext uri="{BB962C8B-B14F-4D97-AF65-F5344CB8AC3E}">
-        <p14:creationId xmlns:p14="http://schemas.microsoft.com/office/powerpoint/2010/main" val="228084747"/>
-      </p:ext>
-    </p:extLst>
   </p:cSld>
   <p:clrMapOvr>
     <a:masterClrMapping/>
@@ -1461,6 +1444,7 @@
               <a:rPr lang="ru-RU"/>
               <a:t>Образец текста</a:t>
             </a:r>
+            <a:endParaRPr lang="ru-RU"/>
           </a:p>
         </p:txBody>
       </p:sp>
@@ -1481,7 +1465,6 @@
           <a:p>
             <a:fld id="{99BDBA1D-B119-4289-857F-3430D9259FA5}" type="datetimeFigureOut">
               <a:rPr lang="ru-RU" smtClean="0"/>
-              <a:t>13.03.2024</a:t>
             </a:fld>
             <a:endParaRPr lang="ru-RU"/>
           </a:p>
@@ -1523,18 +1506,12 @@
           <a:p>
             <a:fld id="{4F5D964E-5065-4CB3-B1F2-43A3BC32BEED}" type="slidenum">
               <a:rPr lang="ru-RU" smtClean="0"/>
-              <a:t>‹#›</a:t>
             </a:fld>
             <a:endParaRPr lang="ru-RU"/>
           </a:p>
         </p:txBody>
       </p:sp>
     </p:spTree>
-    <p:extLst>
-      <p:ext uri="{BB962C8B-B14F-4D97-AF65-F5344CB8AC3E}">
-        <p14:creationId xmlns:p14="http://schemas.microsoft.com/office/powerpoint/2010/main" val="1997444157"/>
-      </p:ext>
-    </p:extLst>
   </p:cSld>
   <p:clrMapOvr>
     <a:masterClrMapping/>
@@ -1655,6 +1632,7 @@
               <a:rPr lang="ru-RU"/>
               <a:t>Образец текста</a:t>
             </a:r>
+            <a:endParaRPr lang="ru-RU"/>
           </a:p>
         </p:txBody>
       </p:sp>
@@ -1722,6 +1700,7 @@
               <a:rPr lang="ru-RU"/>
               <a:t>Образец текста</a:t>
             </a:r>
+            <a:endParaRPr lang="ru-RU"/>
           </a:p>
         </p:txBody>
       </p:sp>
@@ -1793,6 +1772,7 @@
               <a:rPr lang="ru-RU"/>
               <a:t>Образец текста</a:t>
             </a:r>
+            <a:endParaRPr lang="ru-RU"/>
           </a:p>
         </p:txBody>
       </p:sp>
@@ -1860,6 +1840,7 @@
               <a:rPr lang="ru-RU"/>
               <a:t>Образец текста</a:t>
             </a:r>
+            <a:endParaRPr lang="ru-RU"/>
           </a:p>
         </p:txBody>
       </p:sp>
@@ -1931,6 +1912,7 @@
               <a:rPr lang="ru-RU"/>
               <a:t>Образец текста</a:t>
             </a:r>
+            <a:endParaRPr lang="ru-RU"/>
           </a:p>
         </p:txBody>
       </p:sp>
@@ -1998,6 +1980,7 @@
               <a:rPr lang="ru-RU"/>
               <a:t>Образец текста</a:t>
             </a:r>
+            <a:endParaRPr lang="ru-RU"/>
           </a:p>
         </p:txBody>
       </p:sp>
@@ -2018,7 +2001,6 @@
           <a:p>
             <a:fld id="{99BDBA1D-B119-4289-857F-3430D9259FA5}" type="datetimeFigureOut">
               <a:rPr lang="ru-RU" smtClean="0"/>
-              <a:t>13.03.2024</a:t>
             </a:fld>
             <a:endParaRPr lang="ru-RU"/>
           </a:p>
@@ -2060,18 +2042,12 @@
           <a:p>
             <a:fld id="{4F5D964E-5065-4CB3-B1F2-43A3BC32BEED}" type="slidenum">
               <a:rPr lang="ru-RU" smtClean="0"/>
-              <a:t>‹#›</a:t>
             </a:fld>
             <a:endParaRPr lang="ru-RU"/>
           </a:p>
         </p:txBody>
       </p:sp>
     </p:spTree>
-    <p:extLst>
-      <p:ext uri="{BB962C8B-B14F-4D97-AF65-F5344CB8AC3E}">
-        <p14:creationId xmlns:p14="http://schemas.microsoft.com/office/powerpoint/2010/main" val="1525403731"/>
-      </p:ext>
-    </p:extLst>
   </p:cSld>
   <p:clrMapOvr>
     <a:masterClrMapping/>
@@ -2282,6 +2258,7 @@
               <a:rPr lang="ru-RU"/>
               <a:t>Образец текста</a:t>
             </a:r>
+            <a:endParaRPr lang="ru-RU"/>
           </a:p>
         </p:txBody>
       </p:sp>
@@ -2428,6 +2405,7 @@
               <a:rPr lang="ru-RU"/>
               <a:t>Образец текста</a:t>
             </a:r>
+            <a:endParaRPr lang="ru-RU"/>
           </a:p>
         </p:txBody>
       </p:sp>
@@ -2499,6 +2477,7 @@
               <a:rPr lang="ru-RU"/>
               <a:t>Образец текста</a:t>
             </a:r>
+            <a:endParaRPr lang="ru-RU"/>
           </a:p>
         </p:txBody>
       </p:sp>
@@ -2645,6 +2624,7 @@
               <a:rPr lang="ru-RU"/>
               <a:t>Образец текста</a:t>
             </a:r>
+            <a:endParaRPr lang="ru-RU"/>
           </a:p>
         </p:txBody>
       </p:sp>
@@ -2716,6 +2696,7 @@
               <a:rPr lang="ru-RU"/>
               <a:t>Образец текста</a:t>
             </a:r>
+            <a:endParaRPr lang="ru-RU"/>
           </a:p>
         </p:txBody>
       </p:sp>
@@ -2862,6 +2843,7 @@
               <a:rPr lang="ru-RU"/>
               <a:t>Образец текста</a:t>
             </a:r>
+            <a:endParaRPr lang="ru-RU"/>
           </a:p>
         </p:txBody>
       </p:sp>
@@ -2882,7 +2864,6 @@
           <a:p>
             <a:fld id="{99BDBA1D-B119-4289-857F-3430D9259FA5}" type="datetimeFigureOut">
               <a:rPr lang="ru-RU" smtClean="0"/>
-              <a:t>13.03.2024</a:t>
             </a:fld>
             <a:endParaRPr lang="ru-RU"/>
           </a:p>
@@ -2924,18 +2905,12 @@
           <a:p>
             <a:fld id="{4F5D964E-5065-4CB3-B1F2-43A3BC32BEED}" type="slidenum">
               <a:rPr lang="ru-RU" smtClean="0"/>
-              <a:t>‹#›</a:t>
             </a:fld>
             <a:endParaRPr lang="ru-RU"/>
           </a:p>
         </p:txBody>
       </p:sp>
     </p:spTree>
-    <p:extLst>
-      <p:ext uri="{BB962C8B-B14F-4D97-AF65-F5344CB8AC3E}">
-        <p14:creationId xmlns:p14="http://schemas.microsoft.com/office/powerpoint/2010/main" val="668043051"/>
-      </p:ext>
-    </p:extLst>
   </p:cSld>
   <p:clrMapOvr>
     <a:masterClrMapping/>
@@ -3003,6 +2978,7 @@
               <a:rPr lang="ru-RU"/>
               <a:t>Образец текста</a:t>
             </a:r>
+            <a:endParaRPr lang="ru-RU"/>
           </a:p>
           <a:p>
             <a:pPr lvl="1"/>
@@ -3010,6 +2986,7 @@
               <a:rPr lang="ru-RU"/>
               <a:t>Второй уровень</a:t>
             </a:r>
+            <a:endParaRPr lang="ru-RU"/>
           </a:p>
           <a:p>
             <a:pPr lvl="2"/>
@@ -3017,6 +2994,7 @@
               <a:rPr lang="ru-RU"/>
               <a:t>Третий уровень</a:t>
             </a:r>
+            <a:endParaRPr lang="ru-RU"/>
           </a:p>
           <a:p>
             <a:pPr lvl="3"/>
@@ -3024,6 +3002,7 @@
               <a:rPr lang="ru-RU"/>
               <a:t>Четвертый уровень</a:t>
             </a:r>
+            <a:endParaRPr lang="ru-RU"/>
           </a:p>
           <a:p>
             <a:pPr lvl="4"/>
@@ -3052,7 +3031,6 @@
           <a:p>
             <a:fld id="{99BDBA1D-B119-4289-857F-3430D9259FA5}" type="datetimeFigureOut">
               <a:rPr lang="ru-RU" smtClean="0"/>
-              <a:t>13.03.2024</a:t>
             </a:fld>
             <a:endParaRPr lang="ru-RU"/>
           </a:p>
@@ -3094,18 +3072,12 @@
           <a:p>
             <a:fld id="{4F5D964E-5065-4CB3-B1F2-43A3BC32BEED}" type="slidenum">
               <a:rPr lang="ru-RU" smtClean="0"/>
-              <a:t>‹#›</a:t>
             </a:fld>
             <a:endParaRPr lang="ru-RU"/>
           </a:p>
         </p:txBody>
       </p:sp>
     </p:spTree>
-    <p:extLst>
-      <p:ext uri="{BB962C8B-B14F-4D97-AF65-F5344CB8AC3E}">
-        <p14:creationId xmlns:p14="http://schemas.microsoft.com/office/powerpoint/2010/main" val="558419996"/>
-      </p:ext>
-    </p:extLst>
   </p:cSld>
   <p:clrMapOvr>
     <a:masterClrMapping/>
@@ -3187,6 +3159,7 @@
               <a:rPr lang="ru-RU"/>
               <a:t>Образец текста</a:t>
             </a:r>
+            <a:endParaRPr lang="ru-RU"/>
           </a:p>
           <a:p>
             <a:pPr lvl="1"/>
@@ -3194,6 +3167,7 @@
               <a:rPr lang="ru-RU"/>
               <a:t>Второй уровень</a:t>
             </a:r>
+            <a:endParaRPr lang="ru-RU"/>
           </a:p>
           <a:p>
             <a:pPr lvl="2"/>
@@ -3201,6 +3175,7 @@
               <a:rPr lang="ru-RU"/>
               <a:t>Третий уровень</a:t>
             </a:r>
+            <a:endParaRPr lang="ru-RU"/>
           </a:p>
           <a:p>
             <a:pPr lvl="3"/>
@@ -3208,6 +3183,7 @@
               <a:rPr lang="ru-RU"/>
               <a:t>Четвертый уровень</a:t>
             </a:r>
+            <a:endParaRPr lang="ru-RU"/>
           </a:p>
           <a:p>
             <a:pPr lvl="4"/>
@@ -3236,7 +3212,6 @@
           <a:p>
             <a:fld id="{99BDBA1D-B119-4289-857F-3430D9259FA5}" type="datetimeFigureOut">
               <a:rPr lang="ru-RU" smtClean="0"/>
-              <a:t>13.03.2024</a:t>
             </a:fld>
             <a:endParaRPr lang="ru-RU"/>
           </a:p>
@@ -3278,18 +3253,12 @@
           <a:p>
             <a:fld id="{4F5D964E-5065-4CB3-B1F2-43A3BC32BEED}" type="slidenum">
               <a:rPr lang="ru-RU" smtClean="0"/>
-              <a:t>‹#›</a:t>
             </a:fld>
             <a:endParaRPr lang="ru-RU"/>
           </a:p>
         </p:txBody>
       </p:sp>
     </p:spTree>
-    <p:extLst>
-      <p:ext uri="{BB962C8B-B14F-4D97-AF65-F5344CB8AC3E}">
-        <p14:creationId xmlns:p14="http://schemas.microsoft.com/office/powerpoint/2010/main" val="987302087"/>
-      </p:ext>
-    </p:extLst>
   </p:cSld>
   <p:clrMapOvr>
     <a:masterClrMapping/>
@@ -3357,6 +3326,7 @@
               <a:rPr lang="ru-RU"/>
               <a:t>Образец текста</a:t>
             </a:r>
+            <a:endParaRPr lang="ru-RU"/>
           </a:p>
           <a:p>
             <a:pPr lvl="1"/>
@@ -3364,6 +3334,7 @@
               <a:rPr lang="ru-RU"/>
               <a:t>Второй уровень</a:t>
             </a:r>
+            <a:endParaRPr lang="ru-RU"/>
           </a:p>
           <a:p>
             <a:pPr lvl="2"/>
@@ -3371,6 +3342,7 @@
               <a:rPr lang="ru-RU"/>
               <a:t>Третий уровень</a:t>
             </a:r>
+            <a:endParaRPr lang="ru-RU"/>
           </a:p>
           <a:p>
             <a:pPr lvl="3"/>
@@ -3378,6 +3350,7 @@
               <a:rPr lang="ru-RU"/>
               <a:t>Четвертый уровень</a:t>
             </a:r>
+            <a:endParaRPr lang="ru-RU"/>
           </a:p>
           <a:p>
             <a:pPr lvl="4"/>
@@ -3406,7 +3379,6 @@
           <a:p>
             <a:fld id="{99BDBA1D-B119-4289-857F-3430D9259FA5}" type="datetimeFigureOut">
               <a:rPr lang="ru-RU" smtClean="0"/>
-              <a:t>13.03.2024</a:t>
             </a:fld>
             <a:endParaRPr lang="ru-RU"/>
           </a:p>
@@ -3448,18 +3420,12 @@
           <a:p>
             <a:fld id="{4F5D964E-5065-4CB3-B1F2-43A3BC32BEED}" type="slidenum">
               <a:rPr lang="ru-RU" smtClean="0"/>
-              <a:t>‹#›</a:t>
             </a:fld>
             <a:endParaRPr lang="ru-RU"/>
           </a:p>
         </p:txBody>
       </p:sp>
     </p:spTree>
-    <p:extLst>
-      <p:ext uri="{BB962C8B-B14F-4D97-AF65-F5344CB8AC3E}">
-        <p14:creationId xmlns:p14="http://schemas.microsoft.com/office/powerpoint/2010/main" val="828755310"/>
-      </p:ext>
-    </p:extLst>
   </p:cSld>
   <p:clrMapOvr>
     <a:masterClrMapping/>
@@ -3630,6 +3596,7 @@
               <a:rPr lang="ru-RU"/>
               <a:t>Образец текста</a:t>
             </a:r>
+            <a:endParaRPr lang="ru-RU"/>
           </a:p>
         </p:txBody>
       </p:sp>
@@ -3650,7 +3617,6 @@
           <a:p>
             <a:fld id="{99BDBA1D-B119-4289-857F-3430D9259FA5}" type="datetimeFigureOut">
               <a:rPr lang="ru-RU" smtClean="0"/>
-              <a:t>13.03.2024</a:t>
             </a:fld>
             <a:endParaRPr lang="ru-RU"/>
           </a:p>
@@ -3692,18 +3658,12 @@
           <a:p>
             <a:fld id="{4F5D964E-5065-4CB3-B1F2-43A3BC32BEED}" type="slidenum">
               <a:rPr lang="ru-RU" smtClean="0"/>
-              <a:t>‹#›</a:t>
             </a:fld>
             <a:endParaRPr lang="ru-RU"/>
           </a:p>
         </p:txBody>
       </p:sp>
     </p:spTree>
-    <p:extLst>
-      <p:ext uri="{BB962C8B-B14F-4D97-AF65-F5344CB8AC3E}">
-        <p14:creationId xmlns:p14="http://schemas.microsoft.com/office/powerpoint/2010/main" val="2823452927"/>
-      </p:ext>
-    </p:extLst>
   </p:cSld>
   <p:clrMapOvr>
     <a:masterClrMapping/>
@@ -3778,6 +3738,7 @@
               <a:rPr lang="ru-RU"/>
               <a:t>Образец текста</a:t>
             </a:r>
+            <a:endParaRPr lang="ru-RU"/>
           </a:p>
           <a:p>
             <a:pPr lvl="1"/>
@@ -3785,6 +3746,7 @@
               <a:rPr lang="ru-RU"/>
               <a:t>Второй уровень</a:t>
             </a:r>
+            <a:endParaRPr lang="ru-RU"/>
           </a:p>
           <a:p>
             <a:pPr lvl="2"/>
@@ -3792,6 +3754,7 @@
               <a:rPr lang="ru-RU"/>
               <a:t>Третий уровень</a:t>
             </a:r>
+            <a:endParaRPr lang="ru-RU"/>
           </a:p>
           <a:p>
             <a:pPr lvl="3"/>
@@ -3799,6 +3762,7 @@
               <a:rPr lang="ru-RU"/>
               <a:t>Четвертый уровень</a:t>
             </a:r>
+            <a:endParaRPr lang="ru-RU"/>
           </a:p>
           <a:p>
             <a:pPr lvl="4"/>
@@ -3837,6 +3801,7 @@
               <a:rPr lang="ru-RU"/>
               <a:t>Образец текста</a:t>
             </a:r>
+            <a:endParaRPr lang="ru-RU"/>
           </a:p>
           <a:p>
             <a:pPr lvl="1"/>
@@ -3844,6 +3809,7 @@
               <a:rPr lang="ru-RU"/>
               <a:t>Второй уровень</a:t>
             </a:r>
+            <a:endParaRPr lang="ru-RU"/>
           </a:p>
           <a:p>
             <a:pPr lvl="2"/>
@@ -3851,6 +3817,7 @@
               <a:rPr lang="ru-RU"/>
               <a:t>Третий уровень</a:t>
             </a:r>
+            <a:endParaRPr lang="ru-RU"/>
           </a:p>
           <a:p>
             <a:pPr lvl="3"/>
@@ -3858,6 +3825,7 @@
               <a:rPr lang="ru-RU"/>
               <a:t>Четвертый уровень</a:t>
             </a:r>
+            <a:endParaRPr lang="ru-RU"/>
           </a:p>
           <a:p>
             <a:pPr lvl="4"/>
@@ -3886,7 +3854,6 @@
           <a:p>
             <a:fld id="{99BDBA1D-B119-4289-857F-3430D9259FA5}" type="datetimeFigureOut">
               <a:rPr lang="ru-RU" smtClean="0"/>
-              <a:t>13.03.2024</a:t>
             </a:fld>
             <a:endParaRPr lang="ru-RU"/>
           </a:p>
@@ -3928,18 +3895,12 @@
           <a:p>
             <a:fld id="{4F5D964E-5065-4CB3-B1F2-43A3BC32BEED}" type="slidenum">
               <a:rPr lang="ru-RU" smtClean="0"/>
-              <a:t>‹#›</a:t>
             </a:fld>
             <a:endParaRPr lang="ru-RU"/>
           </a:p>
         </p:txBody>
       </p:sp>
     </p:spTree>
-    <p:extLst>
-      <p:ext uri="{BB962C8B-B14F-4D97-AF65-F5344CB8AC3E}">
-        <p14:creationId xmlns:p14="http://schemas.microsoft.com/office/powerpoint/2010/main" val="1452996773"/>
-      </p:ext>
-    </p:extLst>
   </p:cSld>
   <p:clrMapOvr>
     <a:masterClrMapping/>
@@ -4115,6 +4076,7 @@
               <a:rPr lang="ru-RU"/>
               <a:t>Образец текста</a:t>
             </a:r>
+            <a:endParaRPr lang="ru-RU"/>
           </a:p>
         </p:txBody>
       </p:sp>
@@ -4161,6 +4123,7 @@
               <a:rPr lang="ru-RU"/>
               <a:t>Образец текста</a:t>
             </a:r>
+            <a:endParaRPr lang="ru-RU"/>
           </a:p>
           <a:p>
             <a:pPr lvl="1"/>
@@ -4168,6 +4131,7 @@
               <a:rPr lang="ru-RU"/>
               <a:t>Второй уровень</a:t>
             </a:r>
+            <a:endParaRPr lang="ru-RU"/>
           </a:p>
           <a:p>
             <a:pPr lvl="2"/>
@@ -4175,6 +4139,7 @@
               <a:rPr lang="ru-RU"/>
               <a:t>Третий уровень</a:t>
             </a:r>
+            <a:endParaRPr lang="ru-RU"/>
           </a:p>
           <a:p>
             <a:pPr lvl="3"/>
@@ -4182,6 +4147,7 @@
               <a:rPr lang="ru-RU"/>
               <a:t>Четвертый уровень</a:t>
             </a:r>
+            <a:endParaRPr lang="ru-RU"/>
           </a:p>
           <a:p>
             <a:pPr lvl="4"/>
@@ -4257,6 +4223,7 @@
               <a:rPr lang="ru-RU"/>
               <a:t>Образец текста</a:t>
             </a:r>
+            <a:endParaRPr lang="ru-RU"/>
           </a:p>
         </p:txBody>
       </p:sp>
@@ -4303,6 +4270,7 @@
               <a:rPr lang="ru-RU"/>
               <a:t>Образец текста</a:t>
             </a:r>
+            <a:endParaRPr lang="ru-RU"/>
           </a:p>
           <a:p>
             <a:pPr lvl="1"/>
@@ -4310,6 +4278,7 @@
               <a:rPr lang="ru-RU"/>
               <a:t>Второй уровень</a:t>
             </a:r>
+            <a:endParaRPr lang="ru-RU"/>
           </a:p>
           <a:p>
             <a:pPr lvl="2"/>
@@ -4317,6 +4286,7 @@
               <a:rPr lang="ru-RU"/>
               <a:t>Третий уровень</a:t>
             </a:r>
+            <a:endParaRPr lang="ru-RU"/>
           </a:p>
           <a:p>
             <a:pPr lvl="3"/>
@@ -4324,6 +4294,7 @@
               <a:rPr lang="ru-RU"/>
               <a:t>Четвертый уровень</a:t>
             </a:r>
+            <a:endParaRPr lang="ru-RU"/>
           </a:p>
           <a:p>
             <a:pPr lvl="4"/>
@@ -4352,7 +4323,6 @@
           <a:p>
             <a:fld id="{99BDBA1D-B119-4289-857F-3430D9259FA5}" type="datetimeFigureOut">
               <a:rPr lang="ru-RU" smtClean="0"/>
-              <a:t>13.03.2024</a:t>
             </a:fld>
             <a:endParaRPr lang="ru-RU"/>
           </a:p>
@@ -4394,18 +4364,12 @@
           <a:p>
             <a:fld id="{4F5D964E-5065-4CB3-B1F2-43A3BC32BEED}" type="slidenum">
               <a:rPr lang="ru-RU" smtClean="0"/>
-              <a:t>‹#›</a:t>
             </a:fld>
             <a:endParaRPr lang="ru-RU"/>
           </a:p>
         </p:txBody>
       </p:sp>
     </p:spTree>
-    <p:extLst>
-      <p:ext uri="{BB962C8B-B14F-4D97-AF65-F5344CB8AC3E}">
-        <p14:creationId xmlns:p14="http://schemas.microsoft.com/office/powerpoint/2010/main" val="1133677919"/>
-      </p:ext>
-    </p:extLst>
   </p:cSld>
   <p:clrMapOvr>
     <a:masterClrMapping/>
@@ -4470,7 +4434,6 @@
           <a:p>
             <a:fld id="{99BDBA1D-B119-4289-857F-3430D9259FA5}" type="datetimeFigureOut">
               <a:rPr lang="ru-RU" smtClean="0"/>
-              <a:t>13.03.2024</a:t>
             </a:fld>
             <a:endParaRPr lang="ru-RU"/>
           </a:p>
@@ -4512,18 +4475,12 @@
           <a:p>
             <a:fld id="{4F5D964E-5065-4CB3-B1F2-43A3BC32BEED}" type="slidenum">
               <a:rPr lang="ru-RU" smtClean="0"/>
-              <a:t>‹#›</a:t>
             </a:fld>
             <a:endParaRPr lang="ru-RU"/>
           </a:p>
         </p:txBody>
       </p:sp>
     </p:spTree>
-    <p:extLst>
-      <p:ext uri="{BB962C8B-B14F-4D97-AF65-F5344CB8AC3E}">
-        <p14:creationId xmlns:p14="http://schemas.microsoft.com/office/powerpoint/2010/main" val="353413666"/>
-      </p:ext>
-    </p:extLst>
   </p:cSld>
   <p:clrMapOvr>
     <a:masterClrMapping/>
@@ -4565,7 +4522,6 @@
           <a:p>
             <a:fld id="{99BDBA1D-B119-4289-857F-3430D9259FA5}" type="datetimeFigureOut">
               <a:rPr lang="ru-RU" smtClean="0"/>
-              <a:t>13.03.2024</a:t>
             </a:fld>
             <a:endParaRPr lang="ru-RU"/>
           </a:p>
@@ -4607,18 +4563,12 @@
           <a:p>
             <a:fld id="{4F5D964E-5065-4CB3-B1F2-43A3BC32BEED}" type="slidenum">
               <a:rPr lang="ru-RU" smtClean="0"/>
-              <a:t>‹#›</a:t>
             </a:fld>
             <a:endParaRPr lang="ru-RU"/>
           </a:p>
         </p:txBody>
       </p:sp>
     </p:spTree>
-    <p:extLst>
-      <p:ext uri="{BB962C8B-B14F-4D97-AF65-F5344CB8AC3E}">
-        <p14:creationId xmlns:p14="http://schemas.microsoft.com/office/powerpoint/2010/main" val="1236846189"/>
-      </p:ext>
-    </p:extLst>
   </p:cSld>
   <p:clrMapOvr>
     <a:masterClrMapping/>
@@ -4704,6 +4654,7 @@
               <a:rPr lang="ru-RU"/>
               <a:t>Образец текста</a:t>
             </a:r>
+            <a:endParaRPr lang="ru-RU"/>
           </a:p>
           <a:p>
             <a:pPr lvl="1"/>
@@ -4711,6 +4662,7 @@
               <a:rPr lang="ru-RU"/>
               <a:t>Второй уровень</a:t>
             </a:r>
+            <a:endParaRPr lang="ru-RU"/>
           </a:p>
           <a:p>
             <a:pPr lvl="2"/>
@@ -4718,6 +4670,7 @@
               <a:rPr lang="ru-RU"/>
               <a:t>Третий уровень</a:t>
             </a:r>
+            <a:endParaRPr lang="ru-RU"/>
           </a:p>
           <a:p>
             <a:pPr lvl="3"/>
@@ -4725,6 +4678,7 @@
               <a:rPr lang="ru-RU"/>
               <a:t>Четвертый уровень</a:t>
             </a:r>
+            <a:endParaRPr lang="ru-RU"/>
           </a:p>
           <a:p>
             <a:pPr lvl="4"/>
@@ -4800,6 +4754,7 @@
               <a:rPr lang="ru-RU"/>
               <a:t>Образец текста</a:t>
             </a:r>
+            <a:endParaRPr lang="ru-RU"/>
           </a:p>
         </p:txBody>
       </p:sp>
@@ -4820,7 +4775,6 @@
           <a:p>
             <a:fld id="{99BDBA1D-B119-4289-857F-3430D9259FA5}" type="datetimeFigureOut">
               <a:rPr lang="ru-RU" smtClean="0"/>
-              <a:t>13.03.2024</a:t>
             </a:fld>
             <a:endParaRPr lang="ru-RU"/>
           </a:p>
@@ -4862,18 +4816,12 @@
           <a:p>
             <a:fld id="{4F5D964E-5065-4CB3-B1F2-43A3BC32BEED}" type="slidenum">
               <a:rPr lang="ru-RU" smtClean="0"/>
-              <a:t>‹#›</a:t>
             </a:fld>
             <a:endParaRPr lang="ru-RU"/>
           </a:p>
         </p:txBody>
       </p:sp>
     </p:spTree>
-    <p:extLst>
-      <p:ext uri="{BB962C8B-B14F-4D97-AF65-F5344CB8AC3E}">
-        <p14:creationId xmlns:p14="http://schemas.microsoft.com/office/powerpoint/2010/main" val="3627974794"/>
-      </p:ext>
-    </p:extLst>
   </p:cSld>
   <p:clrMapOvr>
     <a:masterClrMapping/>
@@ -5100,6 +5048,7 @@
               <a:rPr lang="ru-RU"/>
               <a:t>Образец текста</a:t>
             </a:r>
+            <a:endParaRPr lang="ru-RU"/>
           </a:p>
         </p:txBody>
       </p:sp>
@@ -5120,7 +5069,6 @@
           <a:p>
             <a:fld id="{99BDBA1D-B119-4289-857F-3430D9259FA5}" type="datetimeFigureOut">
               <a:rPr lang="ru-RU" smtClean="0"/>
-              <a:t>13.03.2024</a:t>
             </a:fld>
             <a:endParaRPr lang="ru-RU"/>
           </a:p>
@@ -5162,18 +5110,12 @@
           <a:p>
             <a:fld id="{4F5D964E-5065-4CB3-B1F2-43A3BC32BEED}" type="slidenum">
               <a:rPr lang="ru-RU" smtClean="0"/>
-              <a:t>‹#›</a:t>
             </a:fld>
             <a:endParaRPr lang="ru-RU"/>
           </a:p>
         </p:txBody>
       </p:sp>
     </p:spTree>
-    <p:extLst>
-      <p:ext uri="{BB962C8B-B14F-4D97-AF65-F5344CB8AC3E}">
-        <p14:creationId xmlns:p14="http://schemas.microsoft.com/office/powerpoint/2010/main" val="2939850634"/>
-      </p:ext>
-    </p:extLst>
   </p:cSld>
   <p:clrMapOvr>
     <a:masterClrMapping/>
@@ -5280,6 +5222,7 @@
               <a:rPr lang="ru-RU"/>
               <a:t>Образец текста</a:t>
             </a:r>
+            <a:endParaRPr lang="ru-RU"/>
           </a:p>
           <a:p>
             <a:pPr lvl="1"/>
@@ -5287,6 +5230,7 @@
               <a:rPr lang="ru-RU"/>
               <a:t>Второй уровень</a:t>
             </a:r>
+            <a:endParaRPr lang="ru-RU"/>
           </a:p>
           <a:p>
             <a:pPr lvl="2"/>
@@ -5294,6 +5238,7 @@
               <a:rPr lang="ru-RU"/>
               <a:t>Третий уровень</a:t>
             </a:r>
+            <a:endParaRPr lang="ru-RU"/>
           </a:p>
           <a:p>
             <a:pPr lvl="3"/>
@@ -5301,6 +5246,7 @@
               <a:rPr lang="ru-RU"/>
               <a:t>Четвертый уровень</a:t>
             </a:r>
+            <a:endParaRPr lang="ru-RU"/>
           </a:p>
           <a:p>
             <a:pPr lvl="4"/>
@@ -5354,7 +5300,6 @@
           <a:p>
             <a:fld id="{99BDBA1D-B119-4289-857F-3430D9259FA5}" type="datetimeFigureOut">
               <a:rPr lang="ru-RU" smtClean="0"/>
-              <a:t>13.03.2024</a:t>
             </a:fld>
             <a:endParaRPr lang="ru-RU"/>
           </a:p>
@@ -5446,38 +5391,32 @@
           <a:p>
             <a:fld id="{4F5D964E-5065-4CB3-B1F2-43A3BC32BEED}" type="slidenum">
               <a:rPr lang="ru-RU" smtClean="0"/>
-              <a:t>‹#›</a:t>
             </a:fld>
             <a:endParaRPr lang="ru-RU"/>
           </a:p>
         </p:txBody>
       </p:sp>
     </p:spTree>
-    <p:extLst>
-      <p:ext uri="{BB962C8B-B14F-4D97-AF65-F5344CB8AC3E}">
-        <p14:creationId xmlns:p14="http://schemas.microsoft.com/office/powerpoint/2010/main" val="3141568202"/>
-      </p:ext>
-    </p:extLst>
   </p:cSld>
   <p:clrMap bg1="dk1" tx1="lt1" bg2="dk2" tx2="lt2" accent1="accent1" accent2="accent2" accent3="accent3" accent4="accent4" accent5="accent5" accent6="accent6" hlink="hlink" folHlink="folHlink"/>
   <p:sldLayoutIdLst>
-    <p:sldLayoutId id="2147483898" r:id="rId1"/>
-    <p:sldLayoutId id="2147483899" r:id="rId2"/>
-    <p:sldLayoutId id="2147483900" r:id="rId3"/>
-    <p:sldLayoutId id="2147483901" r:id="rId4"/>
-    <p:sldLayoutId id="2147483902" r:id="rId5"/>
-    <p:sldLayoutId id="2147483903" r:id="rId6"/>
-    <p:sldLayoutId id="2147483904" r:id="rId7"/>
-    <p:sldLayoutId id="2147483905" r:id="rId8"/>
-    <p:sldLayoutId id="2147483906" r:id="rId9"/>
-    <p:sldLayoutId id="2147483907" r:id="rId10"/>
-    <p:sldLayoutId id="2147483908" r:id="rId11"/>
-    <p:sldLayoutId id="2147483909" r:id="rId12"/>
-    <p:sldLayoutId id="2147483910" r:id="rId13"/>
-    <p:sldLayoutId id="2147483911" r:id="rId14"/>
-    <p:sldLayoutId id="2147483912" r:id="rId15"/>
-    <p:sldLayoutId id="2147483913" r:id="rId16"/>
-    <p:sldLayoutId id="2147483914" r:id="rId17"/>
+    <p:sldLayoutId id="2147483649" r:id="rId1"/>
+    <p:sldLayoutId id="2147483650" r:id="rId2"/>
+    <p:sldLayoutId id="2147483651" r:id="rId3"/>
+    <p:sldLayoutId id="2147483652" r:id="rId4"/>
+    <p:sldLayoutId id="2147483653" r:id="rId5"/>
+    <p:sldLayoutId id="2147483654" r:id="rId6"/>
+    <p:sldLayoutId id="2147483655" r:id="rId7"/>
+    <p:sldLayoutId id="2147483656" r:id="rId8"/>
+    <p:sldLayoutId id="2147483657" r:id="rId9"/>
+    <p:sldLayoutId id="2147483658" r:id="rId10"/>
+    <p:sldLayoutId id="2147483659" r:id="rId11"/>
+    <p:sldLayoutId id="2147483660" r:id="rId12"/>
+    <p:sldLayoutId id="2147483661" r:id="rId13"/>
+    <p:sldLayoutId id="2147483662" r:id="rId14"/>
+    <p:sldLayoutId id="2147483663" r:id="rId15"/>
+    <p:sldLayoutId id="2147483664" r:id="rId16"/>
+    <p:sldLayoutId id="2147483665" r:id="rId17"/>
   </p:sldLayoutIdLst>
   <p:txStyles>
     <p:titleStyle>
@@ -5508,7 +5447,7 @@
           </a:effectLst>
           <a:latin typeface="+mj-lt"/>
           <a:ea typeface="+mj-ea"/>
-          <a:cs typeface="Trebuchet MS"/>
+          <a:cs typeface="Trebuchet MS" panose="020B0603020202020204"/>
         </a:defRPr>
       </a:lvl1pPr>
       <a:lvl2pPr eaLnBrk="1" hangingPunct="1">
@@ -5569,7 +5508,7 @@
       </a:lvl9pPr>
     </p:titleStyle>
     <p:bodyStyle>
-      <a:lvl1pPr marL="342900" indent="-306000" algn="l" defTabSz="457200" rtl="0" eaLnBrk="1" latinLnBrk="0" hangingPunct="1">
+      <a:lvl1pPr marL="342900" indent="-306070" algn="l" defTabSz="457200" rtl="0" eaLnBrk="1" latinLnBrk="0" hangingPunct="1">
         <a:spcBef>
           <a:spcPct val="20000"/>
         </a:spcBef>
@@ -5580,7 +5519,7 @@
           <a:schemeClr val="tx2"/>
         </a:buClr>
         <a:buSzPct val="70000"/>
-        <a:buFont typeface="Wingdings 2" charset="2"/>
+        <a:buFont typeface="Wingdings 2" panose="05020102010507070707" charset="2"/>
         <a:buChar char=""/>
         <a:defRPr sz="2000" kern="1200">
           <a:ln>
@@ -5607,7 +5546,7 @@
           <a:cs typeface="+mn-cs"/>
         </a:defRPr>
       </a:lvl1pPr>
-      <a:lvl2pPr marL="720000" indent="-270000" algn="l" defTabSz="457200" rtl="0" eaLnBrk="1" latinLnBrk="0" hangingPunct="1">
+      <a:lvl2pPr marL="720090" indent="-269875" algn="l" defTabSz="457200" rtl="0" eaLnBrk="1" latinLnBrk="0" hangingPunct="1">
         <a:spcBef>
           <a:spcPct val="20000"/>
         </a:spcBef>
@@ -5618,7 +5557,7 @@
           <a:schemeClr val="tx2"/>
         </a:buClr>
         <a:buSzPct val="70000"/>
-        <a:buFont typeface="Wingdings 2" charset="2"/>
+        <a:buFont typeface="Wingdings 2" panose="05020102010507070707" charset="2"/>
         <a:buChar char=""/>
         <a:defRPr sz="1800" kern="1200">
           <a:ln>
@@ -5645,7 +5584,7 @@
           <a:cs typeface="+mn-cs"/>
         </a:defRPr>
       </a:lvl2pPr>
-      <a:lvl3pPr marL="1026000" indent="-216000" algn="l" defTabSz="457200" rtl="0" eaLnBrk="1" latinLnBrk="0" hangingPunct="1">
+      <a:lvl3pPr marL="1026160" indent="-215900" algn="l" defTabSz="457200" rtl="0" eaLnBrk="1" latinLnBrk="0" hangingPunct="1">
         <a:spcBef>
           <a:spcPct val="20000"/>
         </a:spcBef>
@@ -5656,7 +5595,7 @@
           <a:schemeClr val="tx2"/>
         </a:buClr>
         <a:buSzPct val="70000"/>
-        <a:buFont typeface="Wingdings 2" charset="2"/>
+        <a:buFont typeface="Wingdings 2" panose="05020102010507070707" charset="2"/>
         <a:buChar char=""/>
         <a:defRPr sz="1600" kern="1200">
           <a:ln>
@@ -5683,7 +5622,7 @@
           <a:cs typeface="+mn-cs"/>
         </a:defRPr>
       </a:lvl3pPr>
-      <a:lvl4pPr marL="1386000" indent="-216000" algn="l" defTabSz="457200" rtl="0" eaLnBrk="1" latinLnBrk="0" hangingPunct="1">
+      <a:lvl4pPr marL="1386205" indent="-215900" algn="l" defTabSz="457200" rtl="0" eaLnBrk="1" latinLnBrk="0" hangingPunct="1">
         <a:spcBef>
           <a:spcPct val="20000"/>
         </a:spcBef>
@@ -5694,7 +5633,7 @@
           <a:schemeClr val="tx2"/>
         </a:buClr>
         <a:buSzPct val="70000"/>
-        <a:buFont typeface="Wingdings 2" charset="2"/>
+        <a:buFont typeface="Wingdings 2" panose="05020102010507070707" charset="2"/>
         <a:buChar char=""/>
         <a:defRPr sz="1400" kern="1200">
           <a:ln>
@@ -5721,7 +5660,7 @@
           <a:cs typeface="+mn-cs"/>
         </a:defRPr>
       </a:lvl4pPr>
-      <a:lvl5pPr marL="1674000" indent="-216000" algn="l" defTabSz="457200" rtl="0" eaLnBrk="1" latinLnBrk="0" hangingPunct="1">
+      <a:lvl5pPr marL="1673860" indent="-215900" algn="l" defTabSz="457200" rtl="0" eaLnBrk="1" latinLnBrk="0" hangingPunct="1">
         <a:spcBef>
           <a:spcPct val="20000"/>
         </a:spcBef>
@@ -5732,7 +5671,7 @@
           <a:schemeClr val="tx2"/>
         </a:buClr>
         <a:buSzPct val="70000"/>
-        <a:buFont typeface="Wingdings 2" charset="2"/>
+        <a:buFont typeface="Wingdings 2" panose="05020102010507070707" charset="2"/>
         <a:buChar char=""/>
         <a:defRPr sz="1400" kern="1200">
           <a:ln>
@@ -5759,7 +5698,7 @@
           <a:cs typeface="+mn-cs"/>
         </a:defRPr>
       </a:lvl5pPr>
-      <a:lvl6pPr marL="2014600" indent="-228600" algn="l" defTabSz="457200" rtl="0" eaLnBrk="1" latinLnBrk="0" hangingPunct="1">
+      <a:lvl6pPr marL="2014855" indent="-228600" algn="l" defTabSz="457200" rtl="0" eaLnBrk="1" latinLnBrk="0" hangingPunct="1">
         <a:spcBef>
           <a:spcPct val="20000"/>
         </a:spcBef>
@@ -5770,7 +5709,7 @@
           <a:schemeClr val="tx2"/>
         </a:buClr>
         <a:buSzPct val="70000"/>
-        <a:buFont typeface="Wingdings 2" charset="2"/>
+        <a:buFont typeface="Wingdings 2" panose="05020102010507070707" charset="2"/>
         <a:buChar char=""/>
         <a:defRPr sz="1400" kern="1200">
           <a:ln>
@@ -5797,7 +5736,7 @@
           <a:cs typeface="+mn-cs"/>
         </a:defRPr>
       </a:lvl6pPr>
-      <a:lvl7pPr marL="2401800" indent="-228600" algn="l" defTabSz="457200" rtl="0" eaLnBrk="1" latinLnBrk="0" hangingPunct="1">
+      <a:lvl7pPr marL="2401570" indent="-228600" algn="l" defTabSz="457200" rtl="0" eaLnBrk="1" latinLnBrk="0" hangingPunct="1">
         <a:spcBef>
           <a:spcPct val="20000"/>
         </a:spcBef>
@@ -5808,7 +5747,7 @@
           <a:schemeClr val="tx2"/>
         </a:buClr>
         <a:buSzPct val="70000"/>
-        <a:buFont typeface="Wingdings 2" charset="2"/>
+        <a:buFont typeface="Wingdings 2" panose="05020102010507070707" charset="2"/>
         <a:buChar char=""/>
         <a:defRPr sz="1400" kern="1200">
           <a:ln>
@@ -5835,7 +5774,7 @@
           <a:cs typeface="+mn-cs"/>
         </a:defRPr>
       </a:lvl7pPr>
-      <a:lvl8pPr marL="2789000" indent="-228600" algn="l" defTabSz="457200" rtl="0" eaLnBrk="1" latinLnBrk="0" hangingPunct="1">
+      <a:lvl8pPr marL="2788920" indent="-228600" algn="l" defTabSz="457200" rtl="0" eaLnBrk="1" latinLnBrk="0" hangingPunct="1">
         <a:spcBef>
           <a:spcPct val="20000"/>
         </a:spcBef>
@@ -5846,7 +5785,7 @@
           <a:schemeClr val="tx2"/>
         </a:buClr>
         <a:buSzPct val="70000"/>
-        <a:buFont typeface="Wingdings 2" charset="2"/>
+        <a:buFont typeface="Wingdings 2" panose="05020102010507070707" charset="2"/>
         <a:buChar char=""/>
         <a:defRPr sz="1400" kern="1200">
           <a:ln>
@@ -5873,7 +5812,7 @@
           <a:cs typeface="+mn-cs"/>
         </a:defRPr>
       </a:lvl8pPr>
-      <a:lvl9pPr marL="3106200" indent="-228600" algn="l" defTabSz="457200" rtl="0" eaLnBrk="1" latinLnBrk="0" hangingPunct="1">
+      <a:lvl9pPr marL="3106420" indent="-228600" algn="l" defTabSz="457200" rtl="0" eaLnBrk="1" latinLnBrk="0" hangingPunct="1">
         <a:spcBef>
           <a:spcPct val="20000"/>
         </a:spcBef>
@@ -5884,7 +5823,7 @@
           <a:schemeClr val="tx2"/>
         </a:buClr>
         <a:buSzPct val="70000"/>
-        <a:buFont typeface="Wingdings 2" charset="2"/>
+        <a:buFont typeface="Wingdings 2" panose="05020102010507070707" charset="2"/>
         <a:buChar char=""/>
         <a:defRPr sz="1400" kern="1200">
           <a:ln>
@@ -6030,13 +5969,7 @@
       </p:grpSpPr>
       <p:sp>
         <p:nvSpPr>
-          <p:cNvPr id="3" name="Подзаголовок 2">
-            <a:extLst>
-              <a:ext uri="{FF2B5EF4-FFF2-40B4-BE49-F238E27FC236}">
-                <a16:creationId xmlns:a16="http://schemas.microsoft.com/office/drawing/2014/main" id="{D47D07BA-C897-4799-A440-1BC7D8BB50C6}"/>
-              </a:ext>
-            </a:extLst>
-          </p:cNvPr>
+          <p:cNvPr id="3" name="Подзаголовок 2"/>
           <p:cNvSpPr>
             <a:spLocks noGrp="1"/>
           </p:cNvSpPr>
@@ -6067,18 +6000,19 @@
               </a:rPr>
               <a:t>KnitWit</a:t>
             </a:r>
-          </a:p>
-        </p:txBody>
-      </p:sp>
-      <p:sp>
-        <p:nvSpPr>
-          <p:cNvPr id="5" name="TextBox 4">
-            <a:extLst>
-              <a:ext uri="{FF2B5EF4-FFF2-40B4-BE49-F238E27FC236}">
-                <a16:creationId xmlns:a16="http://schemas.microsoft.com/office/drawing/2014/main" id="{B17C02F4-6684-4AA8-A9B1-9BA47EE81051}"/>
-              </a:ext>
-            </a:extLst>
-          </p:cNvPr>
+            <a:endParaRPr lang="en-US" sz="8800" b="1" dirty="0">
+              <a:solidFill>
+                <a:schemeClr val="tx1"/>
+              </a:solidFill>
+              <a:latin typeface="Times New Roman" panose="02020603050405020304" pitchFamily="18" charset="0"/>
+              <a:cs typeface="Times New Roman" panose="02020603050405020304" pitchFamily="18" charset="0"/>
+            </a:endParaRPr>
+          </a:p>
+        </p:txBody>
+      </p:sp>
+      <p:sp>
+        <p:nvSpPr>
+          <p:cNvPr id="5" name="TextBox 4"/>
           <p:cNvSpPr txBox="1"/>
           <p:nvPr/>
         </p:nvSpPr>
@@ -6098,13 +6032,6 @@
           </a:bodyPr>
           <a:lstStyle/>
           <a:p>
-            <a:r>
-              <a:rPr lang="en-US" dirty="0">
-                <a:latin typeface="Times New Roman" panose="02020603050405020304" pitchFamily="18" charset="0"/>
-                <a:cs typeface="Times New Roman" panose="02020603050405020304" pitchFamily="18" charset="0"/>
-              </a:rPr>
-              <a:t/>
-            </a:r>
             <a:br>
               <a:rPr lang="en-US" dirty="0">
                 <a:latin typeface="Times New Roman" panose="02020603050405020304" pitchFamily="18" charset="0"/>
@@ -6132,6 +6059,10 @@
               </a:rPr>
               <a:t> </a:t>
             </a:r>
+            <a:endParaRPr lang="ru-RU" b="1" dirty="0">
+              <a:latin typeface="Times New Roman" panose="02020603050405020304" pitchFamily="18" charset="0"/>
+              <a:cs typeface="Times New Roman" panose="02020603050405020304" pitchFamily="18" charset="0"/>
+            </a:endParaRPr>
           </a:p>
           <a:p>
             <a:r>
@@ -6141,6 +6072,10 @@
               </a:rPr>
               <a:t>Павлов Александр</a:t>
             </a:r>
+            <a:endParaRPr lang="ru-RU" dirty="0">
+              <a:latin typeface="Times New Roman" panose="02020603050405020304" pitchFamily="18" charset="0"/>
+              <a:cs typeface="Times New Roman" panose="02020603050405020304" pitchFamily="18" charset="0"/>
+            </a:endParaRPr>
           </a:p>
           <a:p>
             <a:r>
@@ -6150,6 +6085,10 @@
               </a:rPr>
               <a:t>Акимушкин Евгений</a:t>
             </a:r>
+            <a:endParaRPr lang="ru-RU" dirty="0">
+              <a:latin typeface="Times New Roman" panose="02020603050405020304" pitchFamily="18" charset="0"/>
+              <a:cs typeface="Times New Roman" panose="02020603050405020304" pitchFamily="18" charset="0"/>
+            </a:endParaRPr>
           </a:p>
           <a:p>
             <a:r>
@@ -6159,18 +6098,16 @@
               </a:rPr>
               <a:t>Перепечко Константин</a:t>
             </a:r>
-          </a:p>
-        </p:txBody>
-      </p:sp>
-      <p:sp>
-        <p:nvSpPr>
-          <p:cNvPr id="12" name="TextBox 11">
-            <a:extLst>
-              <a:ext uri="{FF2B5EF4-FFF2-40B4-BE49-F238E27FC236}">
-                <a16:creationId xmlns:a16="http://schemas.microsoft.com/office/drawing/2014/main" id="{3B72C800-A7A8-4108-BF03-2EB20BE53CD5}"/>
-              </a:ext>
-            </a:extLst>
-          </p:cNvPr>
+            <a:endParaRPr lang="ru-RU" dirty="0">
+              <a:latin typeface="Times New Roman" panose="02020603050405020304" pitchFamily="18" charset="0"/>
+              <a:cs typeface="Times New Roman" panose="02020603050405020304" pitchFamily="18" charset="0"/>
+            </a:endParaRPr>
+          </a:p>
+        </p:txBody>
+      </p:sp>
+      <p:sp>
+        <p:nvSpPr>
+          <p:cNvPr id="12" name="TextBox 11"/>
           <p:cNvSpPr txBox="1"/>
           <p:nvPr/>
         </p:nvSpPr>
@@ -6206,21 +6143,17 @@
               </a:rPr>
               <a:t>.</a:t>
             </a:r>
+            <a:endParaRPr lang="ru-RU" sz="4400" dirty="0">
+              <a:latin typeface="Times New Roman" panose="02020603050405020304" pitchFamily="18" charset="0"/>
+              <a:cs typeface="Times New Roman" panose="02020603050405020304" pitchFamily="18" charset="0"/>
+            </a:endParaRPr>
           </a:p>
         </p:txBody>
       </p:sp>
       <p:cxnSp>
         <p:nvCxnSpPr>
-          <p:cNvPr id="6" name="Прямая соединительная линия 5">
-            <a:extLst>
-              <a:ext uri="{FF2B5EF4-FFF2-40B4-BE49-F238E27FC236}">
-                <a16:creationId xmlns:a16="http://schemas.microsoft.com/office/drawing/2014/main" id="{E55E4F4A-ECCB-4AB6-97E7-5BCC73C6149D}"/>
-              </a:ext>
-            </a:extLst>
-          </p:cNvPr>
-          <p:cNvCxnSpPr>
-            <a:cxnSpLocks/>
-          </p:cNvCxnSpPr>
+          <p:cNvPr id="6" name="Прямая соединительная линия 5"/>
+          <p:cNvCxnSpPr/>
           <p:nvPr/>
         </p:nvCxnSpPr>
         <p:spPr>
@@ -6254,13 +6187,7 @@
       </p:cxnSp>
       <p:sp>
         <p:nvSpPr>
-          <p:cNvPr id="7" name="TextBox 6">
-            <a:extLst>
-              <a:ext uri="{FF2B5EF4-FFF2-40B4-BE49-F238E27FC236}">
-                <a16:creationId xmlns:a16="http://schemas.microsoft.com/office/drawing/2014/main" id="{24F0EACE-57A1-4C0B-926B-FCCFAB74A9CE}"/>
-              </a:ext>
-            </a:extLst>
-          </p:cNvPr>
+          <p:cNvPr id="7" name="TextBox 6"/>
           <p:cNvSpPr txBox="1"/>
           <p:nvPr/>
         </p:nvSpPr>
@@ -6287,25 +6214,23 @@
               </a:rPr>
               <a:t>Страница 01</a:t>
             </a:r>
+            <a:endParaRPr lang="ru-RU" b="1" dirty="0">
+              <a:latin typeface="Times New Roman" panose="02020603050405020304" pitchFamily="18" charset="0"/>
+              <a:cs typeface="Times New Roman" panose="02020603050405020304" pitchFamily="18" charset="0"/>
+            </a:endParaRPr>
           </a:p>
         </p:txBody>
       </p:sp>
       <p:pic>
         <p:nvPicPr>
-          <p:cNvPr id="2050" name="Picture 2">
-            <a:extLst>
-              <a:ext uri="{FF2B5EF4-FFF2-40B4-BE49-F238E27FC236}">
-                <a16:creationId xmlns:a16="http://schemas.microsoft.com/office/drawing/2014/main" id="{5D8F8462-621E-4EA5-883D-885E6FA8269F}"/>
-              </a:ext>
-            </a:extLst>
-          </p:cNvPr>
+          <p:cNvPr id="2050" name="Picture 2"/>
           <p:cNvPicPr>
             <a:picLocks noChangeAspect="1" noChangeArrowheads="1"/>
           </p:cNvPicPr>
           <p:nvPr/>
         </p:nvPicPr>
         <p:blipFill>
-          <a:blip r:embed="rId2">
+          <a:blip r:embed="rId1">
             <a:extLst>
               <a:ext uri="{28A0092B-C50C-407E-A947-70E740481C1C}">
                 <a14:useLocalDpi xmlns:a14="http://schemas.microsoft.com/office/drawing/2010/main" val="0"/>
@@ -6338,11 +6263,6 @@
         </p:spPr>
       </p:pic>
     </p:spTree>
-    <p:extLst>
-      <p:ext uri="{BB962C8B-B14F-4D97-AF65-F5344CB8AC3E}">
-        <p14:creationId xmlns:p14="http://schemas.microsoft.com/office/powerpoint/2010/main" val="2610208119"/>
-      </p:ext>
-    </p:extLst>
   </p:cSld>
   <p:clrMapOvr>
     <a:masterClrMapping/>
@@ -6376,13 +6296,7 @@
       </p:grpSpPr>
       <p:sp>
         <p:nvSpPr>
-          <p:cNvPr id="3" name="Объект 2">
-            <a:extLst>
-              <a:ext uri="{FF2B5EF4-FFF2-40B4-BE49-F238E27FC236}">
-                <a16:creationId xmlns:a16="http://schemas.microsoft.com/office/drawing/2014/main" id="{A5D84FDC-C338-4DF0-82BB-0D762B856725}"/>
-              </a:ext>
-            </a:extLst>
-          </p:cNvPr>
+          <p:cNvPr id="3" name="Объект 2"/>
           <p:cNvSpPr>
             <a:spLocks noGrp="1"/>
           </p:cNvSpPr>
@@ -6438,21 +6352,21 @@
               </a:rPr>
               <a:t> и откройте для себя новый мир ремесел и хобби! Наша платформа предлагает уникальные возможности для творчества и саморазвития. </a:t>
             </a:r>
+            <a:endParaRPr lang="ru-RU" sz="3600" dirty="0">
+              <a:solidFill>
+                <a:schemeClr val="tx1"/>
+              </a:solidFill>
+              <a:effectLst/>
+              <a:latin typeface="Times New Roman" panose="02020603050405020304" pitchFamily="18" charset="0"/>
+              <a:cs typeface="Times New Roman" panose="02020603050405020304" pitchFamily="18" charset="0"/>
+            </a:endParaRPr>
           </a:p>
         </p:txBody>
       </p:sp>
       <p:cxnSp>
         <p:nvCxnSpPr>
-          <p:cNvPr id="4" name="Прямая соединительная линия 3">
-            <a:extLst>
-              <a:ext uri="{FF2B5EF4-FFF2-40B4-BE49-F238E27FC236}">
-                <a16:creationId xmlns:a16="http://schemas.microsoft.com/office/drawing/2014/main" id="{C913574B-9B40-4BD5-9A8D-07A428DF7CA3}"/>
-              </a:ext>
-            </a:extLst>
-          </p:cNvPr>
-          <p:cNvCxnSpPr>
-            <a:cxnSpLocks/>
-          </p:cNvCxnSpPr>
+          <p:cNvPr id="4" name="Прямая соединительная линия 3"/>
+          <p:cNvCxnSpPr/>
           <p:nvPr/>
         </p:nvCxnSpPr>
         <p:spPr>
@@ -6486,13 +6400,7 @@
       </p:cxnSp>
       <p:sp>
         <p:nvSpPr>
-          <p:cNvPr id="5" name="TextBox 4">
-            <a:extLst>
-              <a:ext uri="{FF2B5EF4-FFF2-40B4-BE49-F238E27FC236}">
-                <a16:creationId xmlns:a16="http://schemas.microsoft.com/office/drawing/2014/main" id="{B229629F-F963-4D42-BBEF-E6BBAF11E3C1}"/>
-              </a:ext>
-            </a:extLst>
-          </p:cNvPr>
+          <p:cNvPr id="5" name="TextBox 4"/>
           <p:cNvSpPr txBox="1"/>
           <p:nvPr/>
         </p:nvSpPr>
@@ -6535,13 +6443,7 @@
       </p:sp>
       <p:sp>
         <p:nvSpPr>
-          <p:cNvPr id="7" name="Заголовок 6">
-            <a:extLst>
-              <a:ext uri="{FF2B5EF4-FFF2-40B4-BE49-F238E27FC236}">
-                <a16:creationId xmlns:a16="http://schemas.microsoft.com/office/drawing/2014/main" id="{C254C1B9-A6E9-447D-B267-CF5560DED91E}"/>
-              </a:ext>
-            </a:extLst>
-          </p:cNvPr>
+          <p:cNvPr id="7" name="Заголовок 6"/>
           <p:cNvSpPr>
             <a:spLocks noGrp="1"/>
           </p:cNvSpPr>
@@ -6570,11 +6472,6 @@
         </p:txBody>
       </p:sp>
     </p:spTree>
-    <p:extLst>
-      <p:ext uri="{BB962C8B-B14F-4D97-AF65-F5344CB8AC3E}">
-        <p14:creationId xmlns:p14="http://schemas.microsoft.com/office/powerpoint/2010/main" val="803500406"/>
-      </p:ext>
-    </p:extLst>
   </p:cSld>
   <p:clrMapOvr>
     <a:masterClrMapping/>
@@ -6608,13 +6505,7 @@
       </p:grpSpPr>
       <p:sp>
         <p:nvSpPr>
-          <p:cNvPr id="3" name="Объект 2">
-            <a:extLst>
-              <a:ext uri="{FF2B5EF4-FFF2-40B4-BE49-F238E27FC236}">
-                <a16:creationId xmlns:a16="http://schemas.microsoft.com/office/drawing/2014/main" id="{AAB57768-DA3C-429A-8975-4C02425EF7BC}"/>
-              </a:ext>
-            </a:extLst>
-          </p:cNvPr>
+          <p:cNvPr id="3" name="Объект 2"/>
           <p:cNvSpPr>
             <a:spLocks noGrp="1"/>
           </p:cNvSpPr>
@@ -6648,21 +6539,21 @@
               </a:rPr>
               <a:t>Недостаток платформ для обучения ремеслам и хобби в сравнении с изобилием онлайн-курсов по IT-специальностям.</a:t>
             </a:r>
+            <a:endParaRPr lang="ru-RU" sz="3200" dirty="0">
+              <a:solidFill>
+                <a:schemeClr val="tx1"/>
+              </a:solidFill>
+              <a:effectLst/>
+              <a:latin typeface="Times New Roman" panose="02020603050405020304" pitchFamily="18" charset="0"/>
+              <a:cs typeface="Times New Roman" panose="02020603050405020304" pitchFamily="18" charset="0"/>
+            </a:endParaRPr>
           </a:p>
         </p:txBody>
       </p:sp>
       <p:cxnSp>
         <p:nvCxnSpPr>
-          <p:cNvPr id="6" name="Прямая соединительная линия 5">
-            <a:extLst>
-              <a:ext uri="{FF2B5EF4-FFF2-40B4-BE49-F238E27FC236}">
-                <a16:creationId xmlns:a16="http://schemas.microsoft.com/office/drawing/2014/main" id="{E0EC698F-F6F1-4146-A0AE-575E4514CD95}"/>
-              </a:ext>
-            </a:extLst>
-          </p:cNvPr>
-          <p:cNvCxnSpPr>
-            <a:cxnSpLocks/>
-          </p:cNvCxnSpPr>
+          <p:cNvPr id="6" name="Прямая соединительная линия 5"/>
+          <p:cNvCxnSpPr/>
           <p:nvPr/>
         </p:nvCxnSpPr>
         <p:spPr>
@@ -6696,13 +6587,7 @@
       </p:cxnSp>
       <p:sp>
         <p:nvSpPr>
-          <p:cNvPr id="7" name="TextBox 6">
-            <a:extLst>
-              <a:ext uri="{FF2B5EF4-FFF2-40B4-BE49-F238E27FC236}">
-                <a16:creationId xmlns:a16="http://schemas.microsoft.com/office/drawing/2014/main" id="{811CDB2E-9808-4709-953B-944F3DC7E359}"/>
-              </a:ext>
-            </a:extLst>
-          </p:cNvPr>
+          <p:cNvPr id="7" name="TextBox 6"/>
           <p:cNvSpPr txBox="1"/>
           <p:nvPr/>
         </p:nvSpPr>
@@ -6745,13 +6630,7 @@
       </p:sp>
       <p:sp>
         <p:nvSpPr>
-          <p:cNvPr id="9" name="Заголовок 8">
-            <a:extLst>
-              <a:ext uri="{FF2B5EF4-FFF2-40B4-BE49-F238E27FC236}">
-                <a16:creationId xmlns:a16="http://schemas.microsoft.com/office/drawing/2014/main" id="{E4BCB9BB-327D-4E3A-AFE4-31E6420701A6}"/>
-              </a:ext>
-            </a:extLst>
-          </p:cNvPr>
+          <p:cNvPr id="9" name="Заголовок 8"/>
           <p:cNvSpPr>
             <a:spLocks noGrp="1"/>
           </p:cNvSpPr>
@@ -6780,11 +6659,6 @@
         </p:txBody>
       </p:sp>
     </p:spTree>
-    <p:extLst>
-      <p:ext uri="{BB962C8B-B14F-4D97-AF65-F5344CB8AC3E}">
-        <p14:creationId xmlns:p14="http://schemas.microsoft.com/office/powerpoint/2010/main" val="3714654507"/>
-      </p:ext>
-    </p:extLst>
   </p:cSld>
   <p:clrMapOvr>
     <a:masterClrMapping/>
@@ -6818,16 +6692,8 @@
       </p:grpSpPr>
       <p:cxnSp>
         <p:nvCxnSpPr>
-          <p:cNvPr id="4" name="Прямая соединительная линия 3">
-            <a:extLst>
-              <a:ext uri="{FF2B5EF4-FFF2-40B4-BE49-F238E27FC236}">
-                <a16:creationId xmlns:a16="http://schemas.microsoft.com/office/drawing/2014/main" id="{E107697F-3389-455C-A936-F9D27598F714}"/>
-              </a:ext>
-            </a:extLst>
-          </p:cNvPr>
-          <p:cNvCxnSpPr>
-            <a:cxnSpLocks/>
-          </p:cNvCxnSpPr>
+          <p:cNvPr id="4" name="Прямая соединительная линия 3"/>
+          <p:cNvCxnSpPr/>
           <p:nvPr/>
         </p:nvCxnSpPr>
         <p:spPr>
@@ -6861,13 +6727,7 @@
       </p:cxnSp>
       <p:sp>
         <p:nvSpPr>
-          <p:cNvPr id="5" name="TextBox 4">
-            <a:extLst>
-              <a:ext uri="{FF2B5EF4-FFF2-40B4-BE49-F238E27FC236}">
-                <a16:creationId xmlns:a16="http://schemas.microsoft.com/office/drawing/2014/main" id="{15D65A23-AF61-4EFF-8167-87B15A52D7F6}"/>
-              </a:ext>
-            </a:extLst>
-          </p:cNvPr>
+          <p:cNvPr id="5" name="TextBox 4"/>
           <p:cNvSpPr txBox="1"/>
           <p:nvPr/>
         </p:nvSpPr>
@@ -6910,13 +6770,7 @@
       </p:sp>
       <p:sp>
         <p:nvSpPr>
-          <p:cNvPr id="7" name="TextBox 6">
-            <a:extLst>
-              <a:ext uri="{FF2B5EF4-FFF2-40B4-BE49-F238E27FC236}">
-                <a16:creationId xmlns:a16="http://schemas.microsoft.com/office/drawing/2014/main" id="{49A34F42-CF44-4374-A5AE-8A2A7A9498D4}"/>
-              </a:ext>
-            </a:extLst>
-          </p:cNvPr>
+          <p:cNvPr id="7" name="TextBox 6"/>
           <p:cNvSpPr txBox="1"/>
           <p:nvPr/>
         </p:nvSpPr>
@@ -6962,18 +6816,16 @@
               </a:rPr>
               <a:t>Люди, желающие научиться новым ремеслам и улучшить свои навыки.</a:t>
             </a:r>
-          </a:p>
-        </p:txBody>
-      </p:sp>
-      <p:sp>
-        <p:nvSpPr>
-          <p:cNvPr id="10" name="Прямоугольник: скругленные углы 9">
-            <a:extLst>
-              <a:ext uri="{FF2B5EF4-FFF2-40B4-BE49-F238E27FC236}">
-                <a16:creationId xmlns:a16="http://schemas.microsoft.com/office/drawing/2014/main" id="{E3FD6623-7CAA-4ADF-80A1-34F463D5513B}"/>
-              </a:ext>
-            </a:extLst>
-          </p:cNvPr>
+            <a:endParaRPr lang="ru-RU" dirty="0">
+              <a:latin typeface="Times New Roman" panose="02020603050405020304" pitchFamily="18" charset="0"/>
+              <a:cs typeface="Times New Roman" panose="02020603050405020304" pitchFamily="18" charset="0"/>
+            </a:endParaRPr>
+          </a:p>
+        </p:txBody>
+      </p:sp>
+      <p:sp>
+        <p:nvSpPr>
+          <p:cNvPr id="10" name="Прямоугольник: скругленные углы 9"/>
           <p:cNvSpPr/>
           <p:nvPr/>
         </p:nvSpPr>
@@ -7025,20 +6877,14 @@
       </p:sp>
       <p:sp>
         <p:nvSpPr>
-          <p:cNvPr id="11" name="TextBox 10">
-            <a:extLst>
-              <a:ext uri="{FF2B5EF4-FFF2-40B4-BE49-F238E27FC236}">
-                <a16:creationId xmlns:a16="http://schemas.microsoft.com/office/drawing/2014/main" id="{68D8C802-9B43-48F8-8D10-79BA9DAEC287}"/>
-              </a:ext>
-            </a:extLst>
-          </p:cNvPr>
+          <p:cNvPr id="11" name="TextBox 10"/>
           <p:cNvSpPr txBox="1"/>
           <p:nvPr/>
         </p:nvSpPr>
         <p:spPr>
           <a:xfrm>
             <a:off x="4374775" y="2732618"/>
-            <a:ext cx="3048000" cy="1785104"/>
+            <a:ext cx="3048000" cy="1783715"/>
           </a:xfrm>
           <a:prstGeom prst="rect">
             <a:avLst/>
@@ -7052,9 +6898,16 @@
           <a:lstStyle/>
           <a:p>
             <a:r>
-              <a:rPr lang="ru-RU" sz="2000" b="1" dirty="0"/>
+              <a:rPr lang="ru-RU" sz="2000" b="1" dirty="0">
+                <a:latin typeface="Times New Roman" panose="02020603050405020304" pitchFamily="18" charset="0"/>
+                <a:cs typeface="Times New Roman" panose="02020603050405020304" pitchFamily="18" charset="0"/>
+              </a:rPr>
               <a:t>Хобби-мастера</a:t>
             </a:r>
+            <a:endParaRPr lang="ru-RU" sz="2000" b="1" dirty="0">
+              <a:latin typeface="Times New Roman" panose="02020603050405020304" pitchFamily="18" charset="0"/>
+              <a:cs typeface="Times New Roman" panose="02020603050405020304" pitchFamily="18" charset="0"/>
+            </a:endParaRPr>
           </a:p>
           <a:p>
             <a:endParaRPr lang="ru-RU" b="1" dirty="0">
@@ -7064,28 +6917,29 @@
           </a:p>
           <a:p>
             <a:r>
-              <a:rPr lang="ru-RU" dirty="0"/>
+              <a:rPr lang="ru-RU" dirty="0">
+                <a:latin typeface="Times New Roman" panose="02020603050405020304" pitchFamily="18" charset="0"/>
+                <a:cs typeface="Times New Roman" panose="02020603050405020304" pitchFamily="18" charset="0"/>
+              </a:rPr>
               <a:t>Те, кто хочет находить удовольствие и творческое вдохновение в различных хобби.</a:t>
             </a:r>
-          </a:p>
-        </p:txBody>
-      </p:sp>
-      <p:sp>
-        <p:nvSpPr>
-          <p:cNvPr id="13" name="TextBox 12">
-            <a:extLst>
-              <a:ext uri="{FF2B5EF4-FFF2-40B4-BE49-F238E27FC236}">
-                <a16:creationId xmlns:a16="http://schemas.microsoft.com/office/drawing/2014/main" id="{390D9CBE-2AEC-4657-B548-F9A84F6DA05C}"/>
-              </a:ext>
-            </a:extLst>
-          </p:cNvPr>
+            <a:endParaRPr lang="ru-RU" dirty="0">
+              <a:latin typeface="Times New Roman" panose="02020603050405020304" pitchFamily="18" charset="0"/>
+              <a:cs typeface="Times New Roman" panose="02020603050405020304" pitchFamily="18" charset="0"/>
+            </a:endParaRPr>
+          </a:p>
+        </p:txBody>
+      </p:sp>
+      <p:sp>
+        <p:nvSpPr>
+          <p:cNvPr id="13" name="TextBox 12"/>
           <p:cNvSpPr txBox="1"/>
           <p:nvPr/>
         </p:nvSpPr>
         <p:spPr>
           <a:xfrm>
             <a:off x="7709645" y="2732618"/>
-            <a:ext cx="3944473" cy="1815882"/>
+            <a:ext cx="3944473" cy="1814830"/>
           </a:xfrm>
           <a:prstGeom prst="rect">
             <a:avLst/>
@@ -7099,17 +6953,30 @@
           <a:lstStyle/>
           <a:p>
             <a:r>
-              <a:rPr lang="ru-RU" sz="2000" b="1" dirty="0"/>
+              <a:rPr lang="ru-RU" sz="2000" b="1" dirty="0">
+                <a:latin typeface="Times New Roman" panose="02020603050405020304" pitchFamily="18" charset="0"/>
+                <a:cs typeface="Times New Roman" panose="02020603050405020304" pitchFamily="18" charset="0"/>
+              </a:rPr>
               <a:t>Интересующиеся</a:t>
             </a:r>
             <a:r>
-              <a:rPr lang="en-US" sz="2000" b="1" dirty="0"/>
+              <a:rPr lang="en-US" sz="2000" b="1" dirty="0">
+                <a:latin typeface="Times New Roman" panose="02020603050405020304" pitchFamily="18" charset="0"/>
+                <a:cs typeface="Times New Roman" panose="02020603050405020304" pitchFamily="18" charset="0"/>
+              </a:rPr>
               <a:t> </a:t>
             </a:r>
             <a:r>
-              <a:rPr lang="ru-RU" sz="2000" b="1" dirty="0"/>
+              <a:rPr lang="ru-RU" sz="2000" b="1" dirty="0">
+                <a:latin typeface="Times New Roman" panose="02020603050405020304" pitchFamily="18" charset="0"/>
+                <a:cs typeface="Times New Roman" panose="02020603050405020304" pitchFamily="18" charset="0"/>
+              </a:rPr>
               <a:t>саморазвитием</a:t>
             </a:r>
+            <a:endParaRPr lang="ru-RU" sz="2000" b="1" dirty="0">
+              <a:latin typeface="Times New Roman" panose="02020603050405020304" pitchFamily="18" charset="0"/>
+              <a:cs typeface="Times New Roman" panose="02020603050405020304" pitchFamily="18" charset="0"/>
+            </a:endParaRPr>
           </a:p>
           <a:p>
             <a:endParaRPr lang="ru-RU" b="1" dirty="0">
@@ -7119,21 +6986,22 @@
           </a:p>
           <a:p>
             <a:r>
-              <a:rPr lang="ru-RU" dirty="0"/>
+              <a:rPr lang="ru-RU" dirty="0">
+                <a:latin typeface="Times New Roman" panose="02020603050405020304" pitchFamily="18" charset="0"/>
+                <a:cs typeface="Times New Roman" panose="02020603050405020304" pitchFamily="18" charset="0"/>
+              </a:rPr>
               <a:t>Люди, заинтересованные в личном росте и усовершенствовании своих умений.</a:t>
             </a:r>
-          </a:p>
-        </p:txBody>
-      </p:sp>
-      <p:sp>
-        <p:nvSpPr>
-          <p:cNvPr id="17" name="Прямоугольник: скругленные углы 16">
-            <a:extLst>
-              <a:ext uri="{FF2B5EF4-FFF2-40B4-BE49-F238E27FC236}">
-                <a16:creationId xmlns:a16="http://schemas.microsoft.com/office/drawing/2014/main" id="{E1AD4A4F-115A-42D5-8F98-49A0C8F41A7C}"/>
-              </a:ext>
-            </a:extLst>
-          </p:cNvPr>
+            <a:endParaRPr lang="ru-RU" dirty="0">
+              <a:latin typeface="Times New Roman" panose="02020603050405020304" pitchFamily="18" charset="0"/>
+              <a:cs typeface="Times New Roman" panose="02020603050405020304" pitchFamily="18" charset="0"/>
+            </a:endParaRPr>
+          </a:p>
+        </p:txBody>
+      </p:sp>
+      <p:sp>
+        <p:nvSpPr>
+          <p:cNvPr id="17" name="Прямоугольник: скругленные углы 16"/>
           <p:cNvSpPr/>
           <p:nvPr/>
         </p:nvSpPr>
@@ -7185,13 +7053,7 @@
       </p:sp>
       <p:sp>
         <p:nvSpPr>
-          <p:cNvPr id="18" name="Прямоугольник: скругленные углы 17">
-            <a:extLst>
-              <a:ext uri="{FF2B5EF4-FFF2-40B4-BE49-F238E27FC236}">
-                <a16:creationId xmlns:a16="http://schemas.microsoft.com/office/drawing/2014/main" id="{211691A3-D015-4BBC-895D-DCD9EC53814E}"/>
-              </a:ext>
-            </a:extLst>
-          </p:cNvPr>
+          <p:cNvPr id="18" name="Прямоугольник: скругленные углы 17"/>
           <p:cNvSpPr/>
           <p:nvPr/>
         </p:nvSpPr>
@@ -7243,13 +7105,7 @@
       </p:sp>
       <p:sp>
         <p:nvSpPr>
-          <p:cNvPr id="22" name="Заголовок 21">
-            <a:extLst>
-              <a:ext uri="{FF2B5EF4-FFF2-40B4-BE49-F238E27FC236}">
-                <a16:creationId xmlns:a16="http://schemas.microsoft.com/office/drawing/2014/main" id="{831452C4-2451-42BB-84D2-49AE373CC81F}"/>
-              </a:ext>
-            </a:extLst>
-          </p:cNvPr>
+          <p:cNvPr id="22" name="Заголовок 21"/>
           <p:cNvSpPr>
             <a:spLocks noGrp="1"/>
           </p:cNvSpPr>
@@ -7284,11 +7140,6 @@
         </p:txBody>
       </p:sp>
     </p:spTree>
-    <p:extLst>
-      <p:ext uri="{BB962C8B-B14F-4D97-AF65-F5344CB8AC3E}">
-        <p14:creationId xmlns:p14="http://schemas.microsoft.com/office/powerpoint/2010/main" val="2980945863"/>
-      </p:ext>
-    </p:extLst>
   </p:cSld>
   <p:clrMapOvr>
     <a:masterClrMapping/>
@@ -7322,13 +7173,7 @@
       </p:grpSpPr>
       <p:sp>
         <p:nvSpPr>
-          <p:cNvPr id="3" name="Объект 2">
-            <a:extLst>
-              <a:ext uri="{FF2B5EF4-FFF2-40B4-BE49-F238E27FC236}">
-                <a16:creationId xmlns:a16="http://schemas.microsoft.com/office/drawing/2014/main" id="{76ACAC08-517D-4ADB-88B7-D3A9C4C5F54A}"/>
-              </a:ext>
-            </a:extLst>
-          </p:cNvPr>
+          <p:cNvPr id="3" name="Объект 2"/>
           <p:cNvSpPr>
             <a:spLocks noGrp="1"/>
           </p:cNvSpPr>
@@ -7395,21 +7240,21 @@
               </a:rPr>
               <a:t> это платформа онлайн-обучения, разработанная специально для того, чтобы помочь людям освоить ремесла и хобби. Платформа упрощает процесс обучения, предоставляя структурированные курсы и возможность отслеживания прогресса. </a:t>
             </a:r>
+            <a:endParaRPr lang="ru-RU" sz="3200" dirty="0">
+              <a:solidFill>
+                <a:schemeClr val="tx1"/>
+              </a:solidFill>
+              <a:effectLst/>
+              <a:latin typeface="Times New Roman" panose="02020603050405020304" pitchFamily="18" charset="0"/>
+              <a:cs typeface="Times New Roman" panose="02020603050405020304" pitchFamily="18" charset="0"/>
+            </a:endParaRPr>
           </a:p>
         </p:txBody>
       </p:sp>
       <p:cxnSp>
         <p:nvCxnSpPr>
-          <p:cNvPr id="4" name="Прямая соединительная линия 3">
-            <a:extLst>
-              <a:ext uri="{FF2B5EF4-FFF2-40B4-BE49-F238E27FC236}">
-                <a16:creationId xmlns:a16="http://schemas.microsoft.com/office/drawing/2014/main" id="{0E8DD351-D19A-46F2-A90F-5361325FE143}"/>
-              </a:ext>
-            </a:extLst>
-          </p:cNvPr>
-          <p:cNvCxnSpPr>
-            <a:cxnSpLocks/>
-          </p:cNvCxnSpPr>
+          <p:cNvPr id="4" name="Прямая соединительная линия 3"/>
+          <p:cNvCxnSpPr/>
           <p:nvPr/>
         </p:nvCxnSpPr>
         <p:spPr>
@@ -7443,13 +7288,7 @@
       </p:cxnSp>
       <p:sp>
         <p:nvSpPr>
-          <p:cNvPr id="5" name="TextBox 4">
-            <a:extLst>
-              <a:ext uri="{FF2B5EF4-FFF2-40B4-BE49-F238E27FC236}">
-                <a16:creationId xmlns:a16="http://schemas.microsoft.com/office/drawing/2014/main" id="{F61E992C-B876-4FB8-83C9-70CFDE11C6EA}"/>
-              </a:ext>
-            </a:extLst>
-          </p:cNvPr>
+          <p:cNvPr id="5" name="TextBox 4"/>
           <p:cNvSpPr txBox="1"/>
           <p:nvPr/>
         </p:nvSpPr>
@@ -7492,13 +7331,7 @@
       </p:sp>
       <p:sp>
         <p:nvSpPr>
-          <p:cNvPr id="9" name="Заголовок 8">
-            <a:extLst>
-              <a:ext uri="{FF2B5EF4-FFF2-40B4-BE49-F238E27FC236}">
-                <a16:creationId xmlns:a16="http://schemas.microsoft.com/office/drawing/2014/main" id="{9BA660C8-F8AF-4E16-8EEB-520A908A6ADB}"/>
-              </a:ext>
-            </a:extLst>
-          </p:cNvPr>
+          <p:cNvPr id="9" name="Заголовок 8"/>
           <p:cNvSpPr>
             <a:spLocks noGrp="1"/>
           </p:cNvSpPr>
@@ -7536,11 +7369,6 @@
         </p:txBody>
       </p:sp>
     </p:spTree>
-    <p:extLst>
-      <p:ext uri="{BB962C8B-B14F-4D97-AF65-F5344CB8AC3E}">
-        <p14:creationId xmlns:p14="http://schemas.microsoft.com/office/powerpoint/2010/main" val="1304921664"/>
-      </p:ext>
-    </p:extLst>
   </p:cSld>
   <p:clrMapOvr>
     <a:masterClrMapping/>
@@ -7574,16 +7402,8 @@
       </p:grpSpPr>
       <p:cxnSp>
         <p:nvCxnSpPr>
-          <p:cNvPr id="5" name="Прямая соединительная линия 4">
-            <a:extLst>
-              <a:ext uri="{FF2B5EF4-FFF2-40B4-BE49-F238E27FC236}">
-                <a16:creationId xmlns:a16="http://schemas.microsoft.com/office/drawing/2014/main" id="{14D7DC32-0C17-4C8A-8CD7-F9D1BE1B62D3}"/>
-              </a:ext>
-            </a:extLst>
-          </p:cNvPr>
-          <p:cNvCxnSpPr>
-            <a:cxnSpLocks/>
-          </p:cNvCxnSpPr>
+          <p:cNvPr id="5" name="Прямая соединительная линия 4"/>
+          <p:cNvCxnSpPr/>
           <p:nvPr/>
         </p:nvCxnSpPr>
         <p:spPr>
@@ -7617,13 +7437,7 @@
       </p:cxnSp>
       <p:sp>
         <p:nvSpPr>
-          <p:cNvPr id="6" name="TextBox 5">
-            <a:extLst>
-              <a:ext uri="{FF2B5EF4-FFF2-40B4-BE49-F238E27FC236}">
-                <a16:creationId xmlns:a16="http://schemas.microsoft.com/office/drawing/2014/main" id="{F9682EED-F517-441D-914F-8C90295339BF}"/>
-              </a:ext>
-            </a:extLst>
-          </p:cNvPr>
+          <p:cNvPr id="6" name="TextBox 5"/>
           <p:cNvSpPr txBox="1"/>
           <p:nvPr/>
         </p:nvSpPr>
@@ -7666,13 +7480,7 @@
       </p:sp>
       <p:sp>
         <p:nvSpPr>
-          <p:cNvPr id="7" name="TextBox 6">
-            <a:extLst>
-              <a:ext uri="{FF2B5EF4-FFF2-40B4-BE49-F238E27FC236}">
-                <a16:creationId xmlns:a16="http://schemas.microsoft.com/office/drawing/2014/main" id="{1A2AD56A-98DD-4E28-BB13-7E0FD7BD5787}"/>
-              </a:ext>
-            </a:extLst>
-          </p:cNvPr>
+          <p:cNvPr id="7" name="TextBox 6"/>
           <p:cNvSpPr txBox="1"/>
           <p:nvPr/>
         </p:nvSpPr>
@@ -7760,13 +7568,7 @@
       </p:sp>
       <p:sp>
         <p:nvSpPr>
-          <p:cNvPr id="14" name="TextBox 13">
-            <a:extLst>
-              <a:ext uri="{FF2B5EF4-FFF2-40B4-BE49-F238E27FC236}">
-                <a16:creationId xmlns:a16="http://schemas.microsoft.com/office/drawing/2014/main" id="{47CA547B-7F78-4016-9508-3233C9FA927F}"/>
-              </a:ext>
-            </a:extLst>
-          </p:cNvPr>
+          <p:cNvPr id="14" name="TextBox 13"/>
           <p:cNvSpPr txBox="1"/>
           <p:nvPr/>
         </p:nvSpPr>
@@ -7862,13 +7664,7 @@
       </p:sp>
       <p:sp>
         <p:nvSpPr>
-          <p:cNvPr id="15" name="TextBox 14">
-            <a:extLst>
-              <a:ext uri="{FF2B5EF4-FFF2-40B4-BE49-F238E27FC236}">
-                <a16:creationId xmlns:a16="http://schemas.microsoft.com/office/drawing/2014/main" id="{25E9BB19-5EC6-43DE-9B17-4595D33339FB}"/>
-              </a:ext>
-            </a:extLst>
-          </p:cNvPr>
+          <p:cNvPr id="15" name="TextBox 14"/>
           <p:cNvSpPr txBox="1"/>
           <p:nvPr/>
         </p:nvSpPr>
@@ -7951,13 +7747,37 @@
       </p:sp>
       <p:pic>
         <p:nvPicPr>
-          <p:cNvPr id="12" name="Рисунок 11">
+          <p:cNvPr id="12" name="Рисунок 11"/>
+          <p:cNvPicPr>
+            <a:picLocks noChangeAspect="1"/>
+          </p:cNvPicPr>
+          <p:nvPr/>
+        </p:nvPicPr>
+        <p:blipFill>
+          <a:blip r:embed="rId1" cstate="hqprint">
             <a:extLst>
-              <a:ext uri="{FF2B5EF4-FFF2-40B4-BE49-F238E27FC236}">
-                <a16:creationId xmlns:a16="http://schemas.microsoft.com/office/drawing/2014/main" id="{CC9388E3-9653-4A82-A675-674925C8C033}"/>
+              <a:ext uri="{28A0092B-C50C-407E-A947-70E740481C1C}">
+                <a14:useLocalDpi xmlns:a14="http://schemas.microsoft.com/office/drawing/2010/main" val="0"/>
               </a:ext>
             </a:extLst>
-          </p:cNvPr>
+          </a:blip>
+          <a:stretch>
+            <a:fillRect/>
+          </a:stretch>
+        </p:blipFill>
+        <p:spPr>
+          <a:xfrm>
+            <a:off x="1071486" y="1894177"/>
+            <a:ext cx="1011615" cy="876733"/>
+          </a:xfrm>
+          <a:prstGeom prst="rect">
+            <a:avLst/>
+          </a:prstGeom>
+        </p:spPr>
+      </p:pic>
+      <p:pic>
+        <p:nvPicPr>
+          <p:cNvPr id="17" name="Рисунок 16"/>
           <p:cNvPicPr>
             <a:picLocks noChangeAspect="1"/>
           </p:cNvPicPr>
@@ -7977,8 +7797,8 @@
         </p:blipFill>
         <p:spPr>
           <a:xfrm>
-            <a:off x="1071486" y="1894177"/>
-            <a:ext cx="1011615" cy="876733"/>
+            <a:off x="8918578" y="1894177"/>
+            <a:ext cx="944275" cy="944275"/>
           </a:xfrm>
           <a:prstGeom prst="rect">
             <a:avLst/>
@@ -7987,13 +7807,7 @@
       </p:pic>
       <p:pic>
         <p:nvPicPr>
-          <p:cNvPr id="17" name="Рисунок 16">
-            <a:extLst>
-              <a:ext uri="{FF2B5EF4-FFF2-40B4-BE49-F238E27FC236}">
-                <a16:creationId xmlns:a16="http://schemas.microsoft.com/office/drawing/2014/main" id="{57B9BD96-F4F7-42E0-93B9-61FE414DC2D5}"/>
-              </a:ext>
-            </a:extLst>
-          </p:cNvPr>
+          <p:cNvPr id="19" name="Рисунок 18"/>
           <p:cNvPicPr>
             <a:picLocks noChangeAspect="1"/>
           </p:cNvPicPr>
@@ -8013,59 +7827,17 @@
         </p:blipFill>
         <p:spPr>
           <a:xfrm>
-            <a:off x="8918578" y="1894177"/>
-            <a:ext cx="944275" cy="944275"/>
+            <a:off x="5459572" y="1997442"/>
+            <a:ext cx="893604" cy="670203"/>
           </a:xfrm>
           <a:prstGeom prst="rect">
             <a:avLst/>
           </a:prstGeom>
         </p:spPr>
       </p:pic>
-      <p:pic>
-        <p:nvPicPr>
-          <p:cNvPr id="19" name="Рисунок 18">
-            <a:extLst>
-              <a:ext uri="{FF2B5EF4-FFF2-40B4-BE49-F238E27FC236}">
-                <a16:creationId xmlns:a16="http://schemas.microsoft.com/office/drawing/2014/main" id="{0193BEB2-FE4A-4B8B-8A11-80F774288371}"/>
-              </a:ext>
-            </a:extLst>
-          </p:cNvPr>
-          <p:cNvPicPr>
-            <a:picLocks noChangeAspect="1"/>
-          </p:cNvPicPr>
-          <p:nvPr/>
-        </p:nvPicPr>
-        <p:blipFill>
-          <a:blip r:embed="rId4" cstate="hqprint">
-            <a:extLst>
-              <a:ext uri="{28A0092B-C50C-407E-A947-70E740481C1C}">
-                <a14:useLocalDpi xmlns:a14="http://schemas.microsoft.com/office/drawing/2010/main" val="0"/>
-              </a:ext>
-            </a:extLst>
-          </a:blip>
-          <a:stretch>
-            <a:fillRect/>
-          </a:stretch>
-        </p:blipFill>
-        <p:spPr>
-          <a:xfrm>
-            <a:off x="5459572" y="1997442"/>
-            <a:ext cx="893604" cy="670203"/>
-          </a:xfrm>
-          <a:prstGeom prst="rect">
-            <a:avLst/>
-          </a:prstGeom>
-        </p:spPr>
-      </p:pic>
-      <p:sp>
-        <p:nvSpPr>
-          <p:cNvPr id="21" name="Заголовок 20">
-            <a:extLst>
-              <a:ext uri="{FF2B5EF4-FFF2-40B4-BE49-F238E27FC236}">
-                <a16:creationId xmlns:a16="http://schemas.microsoft.com/office/drawing/2014/main" id="{EE59BF5D-45C5-4F58-805B-E2864BD9C6AC}"/>
-              </a:ext>
-            </a:extLst>
-          </p:cNvPr>
+      <p:sp>
+        <p:nvSpPr>
+          <p:cNvPr id="21" name="Заголовок 20"/>
           <p:cNvSpPr>
             <a:spLocks noGrp="1"/>
           </p:cNvSpPr>
@@ -8094,11 +7866,6 @@
         </p:txBody>
       </p:sp>
     </p:spTree>
-    <p:extLst>
-      <p:ext uri="{BB962C8B-B14F-4D97-AF65-F5344CB8AC3E}">
-        <p14:creationId xmlns:p14="http://schemas.microsoft.com/office/powerpoint/2010/main" val="2506648372"/>
-      </p:ext>
-    </p:extLst>
   </p:cSld>
   <p:clrMapOvr>
     <a:masterClrMapping/>
@@ -8132,16 +7899,8 @@
       </p:grpSpPr>
       <p:cxnSp>
         <p:nvCxnSpPr>
-          <p:cNvPr id="4" name="Прямая соединительная линия 3">
-            <a:extLst>
-              <a:ext uri="{FF2B5EF4-FFF2-40B4-BE49-F238E27FC236}">
-                <a16:creationId xmlns:a16="http://schemas.microsoft.com/office/drawing/2014/main" id="{829D36A1-CF2B-4F4C-8295-5EC90A91FA98}"/>
-              </a:ext>
-            </a:extLst>
-          </p:cNvPr>
-          <p:cNvCxnSpPr>
-            <a:cxnSpLocks/>
-          </p:cNvCxnSpPr>
+          <p:cNvPr id="4" name="Прямая соединительная линия 3"/>
+          <p:cNvCxnSpPr/>
           <p:nvPr/>
         </p:nvCxnSpPr>
         <p:spPr>
@@ -8175,13 +7934,7 @@
       </p:cxnSp>
       <p:sp>
         <p:nvSpPr>
-          <p:cNvPr id="5" name="TextBox 4">
-            <a:extLst>
-              <a:ext uri="{FF2B5EF4-FFF2-40B4-BE49-F238E27FC236}">
-                <a16:creationId xmlns:a16="http://schemas.microsoft.com/office/drawing/2014/main" id="{EFB082C0-5359-4969-908C-F0928980E054}"/>
-              </a:ext>
-            </a:extLst>
-          </p:cNvPr>
+          <p:cNvPr id="5" name="TextBox 4"/>
           <p:cNvSpPr txBox="1"/>
           <p:nvPr/>
         </p:nvSpPr>
@@ -8224,13 +7977,7 @@
       </p:sp>
       <p:sp>
         <p:nvSpPr>
-          <p:cNvPr id="6" name="TextBox 5">
-            <a:extLst>
-              <a:ext uri="{FF2B5EF4-FFF2-40B4-BE49-F238E27FC236}">
-                <a16:creationId xmlns:a16="http://schemas.microsoft.com/office/drawing/2014/main" id="{01653F6A-7440-42B0-B770-1C547CD7A1B2}"/>
-              </a:ext>
-            </a:extLst>
-          </p:cNvPr>
+          <p:cNvPr id="6" name="TextBox 5"/>
           <p:cNvSpPr txBox="1"/>
           <p:nvPr/>
         </p:nvSpPr>
@@ -8257,6 +8004,10 @@
               </a:rPr>
               <a:t>Поддержка творческого потенциала</a:t>
             </a:r>
+            <a:endParaRPr lang="ru-RU" sz="2800" dirty="0">
+              <a:latin typeface="Times New Roman" panose="02020603050405020304" pitchFamily="18" charset="0"/>
+              <a:cs typeface="Times New Roman" panose="02020603050405020304" pitchFamily="18" charset="0"/>
+            </a:endParaRPr>
           </a:p>
           <a:p>
             <a:r>
@@ -8266,18 +8017,16 @@
               </a:rPr>
               <a:t>Мы признаем важность творческого самовыражения и предоставляем возможность нашим пользователям развивать свои навыки в различных сферах ремесел и хобби. Это помогает раскрыть их потенциал и достичь новых высот в творчестве.</a:t>
             </a:r>
-          </a:p>
-        </p:txBody>
-      </p:sp>
-      <p:sp>
-        <p:nvSpPr>
-          <p:cNvPr id="7" name="TextBox 6">
-            <a:extLst>
-              <a:ext uri="{FF2B5EF4-FFF2-40B4-BE49-F238E27FC236}">
-                <a16:creationId xmlns:a16="http://schemas.microsoft.com/office/drawing/2014/main" id="{9BDC0F52-6CBB-4A35-BCF4-3916B0D74449}"/>
-              </a:ext>
-            </a:extLst>
-          </p:cNvPr>
+            <a:endParaRPr lang="ru-RU" dirty="0">
+              <a:latin typeface="Times New Roman" panose="02020603050405020304" pitchFamily="18" charset="0"/>
+              <a:cs typeface="Times New Roman" panose="02020603050405020304" pitchFamily="18" charset="0"/>
+            </a:endParaRPr>
+          </a:p>
+        </p:txBody>
+      </p:sp>
+      <p:sp>
+        <p:nvSpPr>
+          <p:cNvPr id="7" name="TextBox 6"/>
           <p:cNvSpPr txBox="1"/>
           <p:nvPr/>
         </p:nvSpPr>
@@ -8304,6 +8053,10 @@
               </a:rPr>
               <a:t>Разнообразие курсов</a:t>
             </a:r>
+            <a:endParaRPr lang="ru-RU" sz="2800" dirty="0">
+              <a:latin typeface="Times New Roman" panose="02020603050405020304" pitchFamily="18" charset="0"/>
+              <a:cs typeface="Times New Roman" panose="02020603050405020304" pitchFamily="18" charset="0"/>
+            </a:endParaRPr>
           </a:p>
           <a:p>
             <a:r>
@@ -8313,21 +8066,17 @@
               </a:rPr>
               <a:t>Наша платформа предлагает обширный выбор курсов, охватывающих различные виды ремесел и хобби - от вязания и рисования до кулинарии и ремесленных работ. Это позволяет пользователям выбирать подходящие им курсы и наслаждаться процессом обучения в интересующих их областях.</a:t>
             </a:r>
+            <a:endParaRPr lang="ru-RU" dirty="0">
+              <a:latin typeface="Times New Roman" panose="02020603050405020304" pitchFamily="18" charset="0"/>
+              <a:cs typeface="Times New Roman" panose="02020603050405020304" pitchFamily="18" charset="0"/>
+            </a:endParaRPr>
           </a:p>
         </p:txBody>
       </p:sp>
       <p:cxnSp>
         <p:nvCxnSpPr>
-          <p:cNvPr id="9" name="Прямая соединительная линия 8">
-            <a:extLst>
-              <a:ext uri="{FF2B5EF4-FFF2-40B4-BE49-F238E27FC236}">
-                <a16:creationId xmlns:a16="http://schemas.microsoft.com/office/drawing/2014/main" id="{CED22F62-21EC-4B12-950E-B2A9D468634F}"/>
-              </a:ext>
-            </a:extLst>
-          </p:cNvPr>
-          <p:cNvCxnSpPr>
-            <a:cxnSpLocks/>
-          </p:cNvCxnSpPr>
+          <p:cNvPr id="9" name="Прямая соединительная линия 8"/>
+          <p:cNvCxnSpPr/>
           <p:nvPr/>
         </p:nvCxnSpPr>
         <p:spPr>
@@ -8361,13 +8110,7 @@
       </p:cxnSp>
       <p:cxnSp>
         <p:nvCxnSpPr>
-          <p:cNvPr id="16" name="Прямая соединительная линия 15">
-            <a:extLst>
-              <a:ext uri="{FF2B5EF4-FFF2-40B4-BE49-F238E27FC236}">
-                <a16:creationId xmlns:a16="http://schemas.microsoft.com/office/drawing/2014/main" id="{4DE733AA-28BC-49A7-ADFE-08C1DB1DD5A4}"/>
-              </a:ext>
-            </a:extLst>
-          </p:cNvPr>
+          <p:cNvPr id="16" name="Прямая соединительная линия 15"/>
           <p:cNvCxnSpPr/>
           <p:nvPr/>
         </p:nvCxnSpPr>
@@ -8402,16 +8145,8 @@
       </p:cxnSp>
       <p:cxnSp>
         <p:nvCxnSpPr>
-          <p:cNvPr id="15" name="Прямая соединительная линия 14">
-            <a:extLst>
-              <a:ext uri="{FF2B5EF4-FFF2-40B4-BE49-F238E27FC236}">
-                <a16:creationId xmlns:a16="http://schemas.microsoft.com/office/drawing/2014/main" id="{8033ED98-B4FF-4CB6-AE06-E30D95BDF40E}"/>
-              </a:ext>
-            </a:extLst>
-          </p:cNvPr>
-          <p:cNvCxnSpPr>
-            <a:cxnSpLocks/>
-          </p:cNvCxnSpPr>
+          <p:cNvPr id="15" name="Прямая соединительная линия 14"/>
+          <p:cNvCxnSpPr/>
           <p:nvPr/>
         </p:nvCxnSpPr>
         <p:spPr>
@@ -8445,13 +8180,7 @@
       </p:cxnSp>
       <p:cxnSp>
         <p:nvCxnSpPr>
-          <p:cNvPr id="17" name="Прямая соединительная линия 16">
-            <a:extLst>
-              <a:ext uri="{FF2B5EF4-FFF2-40B4-BE49-F238E27FC236}">
-                <a16:creationId xmlns:a16="http://schemas.microsoft.com/office/drawing/2014/main" id="{6B76F0CE-EDFC-492E-89A8-DE518FD32B60}"/>
-              </a:ext>
-            </a:extLst>
-          </p:cNvPr>
+          <p:cNvPr id="17" name="Прямая соединительная линия 16"/>
           <p:cNvCxnSpPr/>
           <p:nvPr/>
         </p:nvCxnSpPr>
@@ -8486,13 +8215,7 @@
       </p:cxnSp>
       <p:sp>
         <p:nvSpPr>
-          <p:cNvPr id="12" name="Прямоугольник: скругленные углы 11">
-            <a:extLst>
-              <a:ext uri="{FF2B5EF4-FFF2-40B4-BE49-F238E27FC236}">
-                <a16:creationId xmlns:a16="http://schemas.microsoft.com/office/drawing/2014/main" id="{AB9FD8E7-163D-441F-8960-C94B7334B0D0}"/>
-              </a:ext>
-            </a:extLst>
-          </p:cNvPr>
+          <p:cNvPr id="12" name="Прямоугольник: скругленные углы 11"/>
           <p:cNvSpPr/>
           <p:nvPr/>
         </p:nvSpPr>
@@ -8544,13 +8267,7 @@
       </p:sp>
       <p:sp>
         <p:nvSpPr>
-          <p:cNvPr id="20" name="Прямоугольник: скругленные углы 19">
-            <a:extLst>
-              <a:ext uri="{FF2B5EF4-FFF2-40B4-BE49-F238E27FC236}">
-                <a16:creationId xmlns:a16="http://schemas.microsoft.com/office/drawing/2014/main" id="{A801ACB9-7363-4A8E-BAC9-85135457A3DC}"/>
-              </a:ext>
-            </a:extLst>
-          </p:cNvPr>
+          <p:cNvPr id="20" name="Прямоугольник: скругленные углы 19"/>
           <p:cNvSpPr/>
           <p:nvPr/>
         </p:nvSpPr>
@@ -8602,13 +8319,7 @@
       </p:sp>
       <p:sp>
         <p:nvSpPr>
-          <p:cNvPr id="21" name="Прямоугольник: скругленные углы 20">
-            <a:extLst>
-              <a:ext uri="{FF2B5EF4-FFF2-40B4-BE49-F238E27FC236}">
-                <a16:creationId xmlns:a16="http://schemas.microsoft.com/office/drawing/2014/main" id="{FF28CD69-4336-4DC6-B50F-DDC6933F7D85}"/>
-              </a:ext>
-            </a:extLst>
-          </p:cNvPr>
+          <p:cNvPr id="21" name="Прямоугольник: скругленные углы 20"/>
           <p:cNvSpPr/>
           <p:nvPr/>
         </p:nvSpPr>
@@ -8660,13 +8371,7 @@
       </p:sp>
       <p:sp>
         <p:nvSpPr>
-          <p:cNvPr id="22" name="TextBox 21">
-            <a:extLst>
-              <a:ext uri="{FF2B5EF4-FFF2-40B4-BE49-F238E27FC236}">
-                <a16:creationId xmlns:a16="http://schemas.microsoft.com/office/drawing/2014/main" id="{6F476507-FC07-431B-A38B-8CC93963FD9A}"/>
-              </a:ext>
-            </a:extLst>
-          </p:cNvPr>
+          <p:cNvPr id="22" name="TextBox 21"/>
           <p:cNvSpPr txBox="1"/>
           <p:nvPr/>
         </p:nvSpPr>
@@ -8693,6 +8398,10 @@
               </a:rPr>
               <a:t>Уникальная специализация </a:t>
             </a:r>
+            <a:endParaRPr lang="ru-RU" sz="2800" dirty="0">
+              <a:latin typeface="Times New Roman" panose="02020603050405020304" pitchFamily="18" charset="0"/>
+              <a:cs typeface="Times New Roman" panose="02020603050405020304" pitchFamily="18" charset="0"/>
+            </a:endParaRPr>
           </a:p>
           <a:p>
             <a:r>
@@ -8702,18 +8411,16 @@
               </a:rPr>
               <a:t>Наш проект ориентирован на предоставление обширного выбора курсов по ремеслам и хобби, что делает его уникальным на рынке онлайн-образования. В отличие от большинства конкурентов, фокусирующихся на IT-специальностях, мы стремимся удовлетворить спрос на творческое обучение.</a:t>
             </a:r>
-          </a:p>
-        </p:txBody>
-      </p:sp>
-      <p:sp>
-        <p:nvSpPr>
-          <p:cNvPr id="26" name="Заголовок 25">
-            <a:extLst>
-              <a:ext uri="{FF2B5EF4-FFF2-40B4-BE49-F238E27FC236}">
-                <a16:creationId xmlns:a16="http://schemas.microsoft.com/office/drawing/2014/main" id="{9A2831E4-349C-401B-B455-9B7D1515793D}"/>
-              </a:ext>
-            </a:extLst>
-          </p:cNvPr>
+            <a:endParaRPr lang="ru-RU" dirty="0">
+              <a:latin typeface="Times New Roman" panose="02020603050405020304" pitchFamily="18" charset="0"/>
+              <a:cs typeface="Times New Roman" panose="02020603050405020304" pitchFamily="18" charset="0"/>
+            </a:endParaRPr>
+          </a:p>
+        </p:txBody>
+      </p:sp>
+      <p:sp>
+        <p:nvSpPr>
+          <p:cNvPr id="26" name="Заголовок 25"/>
           <p:cNvSpPr>
             <a:spLocks noGrp="1"/>
           </p:cNvSpPr>
@@ -8742,11 +8449,6 @@
         </p:txBody>
       </p:sp>
     </p:spTree>
-    <p:extLst>
-      <p:ext uri="{BB962C8B-B14F-4D97-AF65-F5344CB8AC3E}">
-        <p14:creationId xmlns:p14="http://schemas.microsoft.com/office/powerpoint/2010/main" val="3551295672"/>
-      </p:ext>
-    </p:extLst>
   </p:cSld>
   <p:clrMapOvr>
     <a:masterClrMapping/>
@@ -8780,20 +8482,14 @@
       </p:grpSpPr>
       <p:sp>
         <p:nvSpPr>
-          <p:cNvPr id="10" name="Прямоугольник: скругленные углы 9">
-            <a:extLst>
-              <a:ext uri="{FF2B5EF4-FFF2-40B4-BE49-F238E27FC236}">
-                <a16:creationId xmlns:a16="http://schemas.microsoft.com/office/drawing/2014/main" id="{9D813728-3C36-4748-8E73-A57DE53315BC}"/>
-              </a:ext>
-            </a:extLst>
-          </p:cNvPr>
+          <p:cNvPr id="9" name="Прямоугольник: скругленные углы 8"/>
           <p:cNvSpPr/>
           <p:nvPr/>
         </p:nvSpPr>
         <p:spPr>
           <a:xfrm>
-            <a:off x="913795" y="5172902"/>
-            <a:ext cx="10535255" cy="1418809"/>
+            <a:off x="913795" y="2201288"/>
+            <a:ext cx="4908363" cy="3026665"/>
           </a:xfrm>
           <a:prstGeom prst="roundRect">
             <a:avLst/>
@@ -8832,20 +8528,14 @@
       </p:sp>
       <p:sp>
         <p:nvSpPr>
-          <p:cNvPr id="9" name="Прямоугольник: скругленные углы 8">
-            <a:extLst>
-              <a:ext uri="{FF2B5EF4-FFF2-40B4-BE49-F238E27FC236}">
-                <a16:creationId xmlns:a16="http://schemas.microsoft.com/office/drawing/2014/main" id="{54FE72B9-651F-453B-B874-81FE55A81BC3}"/>
-              </a:ext>
-            </a:extLst>
-          </p:cNvPr>
+          <p:cNvPr id="8" name="Прямоугольник: скругленные углы 7"/>
           <p:cNvSpPr/>
           <p:nvPr/>
         </p:nvSpPr>
         <p:spPr>
           <a:xfrm>
-            <a:off x="913795" y="1792983"/>
-            <a:ext cx="4908363" cy="3026665"/>
+            <a:off x="6177940" y="2201288"/>
+            <a:ext cx="5271110" cy="3026665"/>
           </a:xfrm>
           <a:prstGeom prst="roundRect">
             <a:avLst/>
@@ -8882,70 +8572,10 @@
           </a:p>
         </p:txBody>
       </p:sp>
-      <p:sp>
-        <p:nvSpPr>
-          <p:cNvPr id="8" name="Прямоугольник: скругленные углы 7">
-            <a:extLst>
-              <a:ext uri="{FF2B5EF4-FFF2-40B4-BE49-F238E27FC236}">
-                <a16:creationId xmlns:a16="http://schemas.microsoft.com/office/drawing/2014/main" id="{7A8D458F-8234-4871-94B4-EB62B539D580}"/>
-              </a:ext>
-            </a:extLst>
-          </p:cNvPr>
-          <p:cNvSpPr/>
-          <p:nvPr/>
-        </p:nvSpPr>
-        <p:spPr>
-          <a:xfrm>
-            <a:off x="6177940" y="1792983"/>
-            <a:ext cx="5271110" cy="3026665"/>
-          </a:xfrm>
-          <a:prstGeom prst="roundRect">
-            <a:avLst/>
-          </a:prstGeom>
-          <a:noFill/>
-          <a:ln>
-            <a:solidFill>
-              <a:srgbClr val="EB295C"/>
-            </a:solidFill>
-          </a:ln>
-        </p:spPr>
-        <p:style>
-          <a:lnRef idx="2">
-            <a:schemeClr val="accent1">
-              <a:shade val="50000"/>
-            </a:schemeClr>
-          </a:lnRef>
-          <a:fillRef idx="1">
-            <a:schemeClr val="accent1"/>
-          </a:fillRef>
-          <a:effectRef idx="0">
-            <a:schemeClr val="accent1"/>
-          </a:effectRef>
-          <a:fontRef idx="minor">
-            <a:schemeClr val="lt1"/>
-          </a:fontRef>
-        </p:style>
-        <p:txBody>
-          <a:bodyPr rtlCol="0" anchor="ctr"/>
-          <a:lstStyle/>
-          <a:p>
-            <a:pPr algn="ctr"/>
-            <a:endParaRPr lang="ru-RU"/>
-          </a:p>
-        </p:txBody>
-      </p:sp>
       <p:cxnSp>
         <p:nvCxnSpPr>
-          <p:cNvPr id="4" name="Прямая соединительная линия 3">
-            <a:extLst>
-              <a:ext uri="{FF2B5EF4-FFF2-40B4-BE49-F238E27FC236}">
-                <a16:creationId xmlns:a16="http://schemas.microsoft.com/office/drawing/2014/main" id="{B4D16589-48C9-423A-9047-71B230697A95}"/>
-              </a:ext>
-            </a:extLst>
-          </p:cNvPr>
-          <p:cNvCxnSpPr>
-            <a:cxnSpLocks/>
-          </p:cNvCxnSpPr>
+          <p:cNvPr id="4" name="Прямая соединительная линия 3"/>
+          <p:cNvCxnSpPr/>
           <p:nvPr/>
         </p:nvCxnSpPr>
         <p:spPr>
@@ -8979,13 +8609,7 @@
       </p:cxnSp>
       <p:sp>
         <p:nvSpPr>
-          <p:cNvPr id="5" name="TextBox 4">
-            <a:extLst>
-              <a:ext uri="{FF2B5EF4-FFF2-40B4-BE49-F238E27FC236}">
-                <a16:creationId xmlns:a16="http://schemas.microsoft.com/office/drawing/2014/main" id="{F5D034F7-8860-49DB-907C-5DA883AC0B60}"/>
-              </a:ext>
-            </a:extLst>
-          </p:cNvPr>
+          <p:cNvPr id="5" name="TextBox 4"/>
           <p:cNvSpPr txBox="1"/>
           <p:nvPr/>
         </p:nvSpPr>
@@ -9028,20 +8652,14 @@
       </p:sp>
       <p:sp>
         <p:nvSpPr>
-          <p:cNvPr id="6" name="TextBox 5">
-            <a:extLst>
-              <a:ext uri="{FF2B5EF4-FFF2-40B4-BE49-F238E27FC236}">
-                <a16:creationId xmlns:a16="http://schemas.microsoft.com/office/drawing/2014/main" id="{E734F1EF-6B66-42EE-BE6D-F46572BB1F65}"/>
-              </a:ext>
-            </a:extLst>
-          </p:cNvPr>
+          <p:cNvPr id="6" name="TextBox 5"/>
           <p:cNvSpPr txBox="1"/>
           <p:nvPr/>
         </p:nvSpPr>
         <p:spPr>
           <a:xfrm>
-            <a:off x="6390574" y="2007150"/>
-            <a:ext cx="4845842" cy="2400657"/>
+            <a:off x="6390574" y="2415455"/>
+            <a:ext cx="4845842" cy="2676525"/>
           </a:xfrm>
           <a:prstGeom prst="rect">
             <a:avLst/>
@@ -9061,6 +8679,10 @@
               </a:rPr>
               <a:t>Монетизация через рекламу</a:t>
             </a:r>
+            <a:endParaRPr lang="ru-RU" sz="2400" dirty="0">
+              <a:latin typeface="Times New Roman" panose="02020603050405020304" pitchFamily="18" charset="0"/>
+              <a:cs typeface="Times New Roman" panose="02020603050405020304" pitchFamily="18" charset="0"/>
+            </a:endParaRPr>
           </a:p>
           <a:p>
             <a:endParaRPr lang="ru-RU" dirty="0">
@@ -9074,71 +8696,7 @@
                 <a:latin typeface="Times New Roman" panose="02020603050405020304" pitchFamily="18" charset="0"/>
                 <a:cs typeface="Times New Roman" panose="02020603050405020304" pitchFamily="18" charset="0"/>
               </a:rPr>
-              <a:t> Для обеспечения бесплатного доступа к контенту мы используем модель монетизации через рекламу. Всплывающие окна с рекламными предложениями обеспечивают финансирование платформы и поддерживают ее развитие.</a:t>
-            </a:r>
-          </a:p>
-        </p:txBody>
-      </p:sp>
-      <p:sp>
-        <p:nvSpPr>
-          <p:cNvPr id="7" name="TextBox 6">
-            <a:extLst>
-              <a:ext uri="{FF2B5EF4-FFF2-40B4-BE49-F238E27FC236}">
-                <a16:creationId xmlns:a16="http://schemas.microsoft.com/office/drawing/2014/main" id="{F6121409-2B30-4FF7-AF49-6D4541B46674}"/>
-              </a:ext>
-            </a:extLst>
-          </p:cNvPr>
-          <p:cNvSpPr txBox="1"/>
-          <p:nvPr/>
-        </p:nvSpPr>
-        <p:spPr>
-          <a:xfrm>
-            <a:off x="1091686" y="5150844"/>
-            <a:ext cx="10186519" cy="1384995"/>
-          </a:xfrm>
-          <a:prstGeom prst="rect">
-            <a:avLst/>
-          </a:prstGeom>
-          <a:noFill/>
-        </p:spPr>
-        <p:txBody>
-          <a:bodyPr wrap="square" rtlCol="0">
-            <a:spAutoFit/>
-          </a:bodyPr>
-          <a:lstStyle/>
-          <a:p>
-            <a:r>
-              <a:rPr lang="ru-RU" sz="2400" dirty="0">
-                <a:latin typeface="Times New Roman" panose="02020603050405020304" pitchFamily="18" charset="0"/>
-                <a:cs typeface="Times New Roman" panose="02020603050405020304" pitchFamily="18" charset="0"/>
-              </a:rPr>
-              <a:t>Поддержка развития платформы</a:t>
-            </a:r>
-            <a:endParaRPr lang="en-US" sz="2400" dirty="0">
-              <a:latin typeface="Times New Roman" panose="02020603050405020304" pitchFamily="18" charset="0"/>
-              <a:cs typeface="Times New Roman" panose="02020603050405020304" pitchFamily="18" charset="0"/>
-            </a:endParaRPr>
-          </a:p>
-          <a:p>
-            <a:endParaRPr lang="ru-RU" sz="2400" dirty="0">
-              <a:latin typeface="Times New Roman" panose="02020603050405020304" pitchFamily="18" charset="0"/>
-              <a:cs typeface="Times New Roman" panose="02020603050405020304" pitchFamily="18" charset="0"/>
-            </a:endParaRPr>
-          </a:p>
-          <a:p>
-            <a:r>
-              <a:rPr lang="ru-RU" dirty="0">
-                <a:latin typeface="Times New Roman" panose="02020603050405020304" pitchFamily="18" charset="0"/>
-                <a:cs typeface="Times New Roman" panose="02020603050405020304" pitchFamily="18" charset="0"/>
-              </a:rPr>
-              <a:t> </a:t>
-            </a:r>
-            <a:r>
-              <a:rPr lang="ru-RU" dirty="0" smtClean="0">
-                <a:latin typeface="Times New Roman" panose="02020603050405020304" pitchFamily="18" charset="0"/>
-                <a:cs typeface="Times New Roman" panose="02020603050405020304" pitchFamily="18" charset="0"/>
-              </a:rPr>
-              <a:t>В долгосрочной перспективе поддержка развития платформы будет происходить с помощью добавления платных курсов. Это ускорит процесс разработки и обновления продукта.</a:t>
+              <a:t> Для обеспечения бесплатного доступа к контенту, в долгосрочной перспективе мы предлагаем использовать модель монетизации через рекламу. Всплывающие окна с рекламными предложениями обеспечивают финансирование платформы и поддерживают ее развитие.</a:t>
             </a:r>
             <a:endParaRPr lang="ru-RU" dirty="0">
               <a:latin typeface="Times New Roman" panose="02020603050405020304" pitchFamily="18" charset="0"/>
@@ -9149,13 +8707,7 @@
       </p:sp>
       <p:sp>
         <p:nvSpPr>
-          <p:cNvPr id="12" name="Заголовок 11">
-            <a:extLst>
-              <a:ext uri="{FF2B5EF4-FFF2-40B4-BE49-F238E27FC236}">
-                <a16:creationId xmlns:a16="http://schemas.microsoft.com/office/drawing/2014/main" id="{6D247E30-7743-40FC-A42C-30CE42AD1768}"/>
-              </a:ext>
-            </a:extLst>
-          </p:cNvPr>
+          <p:cNvPr id="12" name="Заголовок 11"/>
           <p:cNvSpPr>
             <a:spLocks noGrp="1"/>
           </p:cNvSpPr>
@@ -9185,19 +8737,13 @@
       </p:sp>
       <p:sp>
         <p:nvSpPr>
-          <p:cNvPr id="11" name="TextBox 10">
-            <a:extLst>
-              <a:ext uri="{FF2B5EF4-FFF2-40B4-BE49-F238E27FC236}">
-                <a16:creationId xmlns:a16="http://schemas.microsoft.com/office/drawing/2014/main" id="{4A1F9EB8-13C8-4FAB-9E9A-149FF50CB53C}"/>
-              </a:ext>
-            </a:extLst>
-          </p:cNvPr>
+          <p:cNvPr id="11" name="TextBox 10"/>
           <p:cNvSpPr txBox="1"/>
           <p:nvPr/>
         </p:nvSpPr>
         <p:spPr>
           <a:xfrm>
-            <a:off x="1091686" y="2007150"/>
+            <a:off x="1091686" y="2415455"/>
             <a:ext cx="4908363" cy="2031325"/>
           </a:xfrm>
           <a:prstGeom prst="rect">
@@ -9244,15 +8790,14 @@
               </a:rPr>
               <a:t>Наша платформа предлагает пользователям бесплатный доступ к основным курсам и материалам, что делает обучение доступным для всех.</a:t>
             </a:r>
+            <a:endParaRPr lang="ru-RU" dirty="0">
+              <a:latin typeface="Times New Roman" panose="02020603050405020304" pitchFamily="18" charset="0"/>
+              <a:cs typeface="Times New Roman" panose="02020603050405020304" pitchFamily="18" charset="0"/>
+            </a:endParaRPr>
           </a:p>
         </p:txBody>
       </p:sp>
     </p:spTree>
-    <p:extLst>
-      <p:ext uri="{BB962C8B-B14F-4D97-AF65-F5344CB8AC3E}">
-        <p14:creationId xmlns:p14="http://schemas.microsoft.com/office/powerpoint/2010/main" val="1489594765"/>
-      </p:ext>
-    </p:extLst>
   </p:cSld>
   <p:clrMapOvr>
     <a:masterClrMapping/>
@@ -9286,13 +8831,7 @@
       </p:grpSpPr>
       <p:sp>
         <p:nvSpPr>
-          <p:cNvPr id="3" name="Объект 2">
-            <a:extLst>
-              <a:ext uri="{FF2B5EF4-FFF2-40B4-BE49-F238E27FC236}">
-                <a16:creationId xmlns:a16="http://schemas.microsoft.com/office/drawing/2014/main" id="{51E6BFFE-6E7A-4C05-87BD-2416CB4D015A}"/>
-              </a:ext>
-            </a:extLst>
-          </p:cNvPr>
+          <p:cNvPr id="3" name="Объект 2"/>
           <p:cNvSpPr>
             <a:spLocks noGrp="1"/>
           </p:cNvSpPr>
@@ -9326,6 +8865,14 @@
               </a:rPr>
               <a:t>Краткосрочные цели: </a:t>
             </a:r>
+            <a:endParaRPr lang="ru-RU" sz="3900" dirty="0">
+              <a:solidFill>
+                <a:schemeClr val="tx1"/>
+              </a:solidFill>
+              <a:effectLst/>
+              <a:latin typeface="Times New Roman" panose="02020603050405020304" pitchFamily="18" charset="0"/>
+              <a:cs typeface="Times New Roman" panose="02020603050405020304" pitchFamily="18" charset="0"/>
+            </a:endParaRPr>
           </a:p>
           <a:p>
             <a:pPr marL="0" indent="0" algn="l">
@@ -9342,6 +8889,14 @@
               </a:rPr>
               <a:t>Разработка MVP, включающего базовый функционал платформы, такой как доступ к курсам и возможность регистрации.</a:t>
             </a:r>
+            <a:endParaRPr lang="ru-RU" sz="3000" dirty="0">
+              <a:solidFill>
+                <a:schemeClr val="tx1"/>
+              </a:solidFill>
+              <a:effectLst/>
+              <a:latin typeface="Times New Roman" panose="02020603050405020304" pitchFamily="18" charset="0"/>
+              <a:cs typeface="Times New Roman" panose="02020603050405020304" pitchFamily="18" charset="0"/>
+            </a:endParaRPr>
           </a:p>
           <a:p>
             <a:pPr marL="0" indent="0" algn="l">
@@ -9371,22 +8926,19 @@
               </a:rPr>
               <a:t>Долгосрочные цели: </a:t>
             </a:r>
+            <a:endParaRPr lang="ru-RU" sz="3900" dirty="0">
+              <a:solidFill>
+                <a:schemeClr val="tx1"/>
+              </a:solidFill>
+              <a:effectLst/>
+              <a:latin typeface="Times New Roman" panose="02020603050405020304" pitchFamily="18" charset="0"/>
+              <a:cs typeface="Times New Roman" panose="02020603050405020304" pitchFamily="18" charset="0"/>
+            </a:endParaRPr>
           </a:p>
           <a:p>
             <a:pPr marL="0" indent="0" algn="l">
               <a:buNone/>
             </a:pPr>
-            <a:r>
-              <a:rPr lang="ru-RU" sz="3000" dirty="0" smtClean="0">
-                <a:solidFill>
-                  <a:schemeClr val="tx1"/>
-                </a:solidFill>
-                <a:effectLst/>
-                <a:latin typeface="Times New Roman" panose="02020603050405020304" pitchFamily="18" charset="0"/>
-                <a:cs typeface="Times New Roman" panose="02020603050405020304" pitchFamily="18" charset="0"/>
-              </a:rPr>
-              <a:t>Добавление </a:t>
-            </a:r>
             <a:r>
               <a:rPr lang="ru-RU" sz="3000" dirty="0">
                 <a:solidFill>
@@ -9396,8 +8948,16 @@
                 <a:latin typeface="Times New Roman" panose="02020603050405020304" pitchFamily="18" charset="0"/>
                 <a:cs typeface="Times New Roman" panose="02020603050405020304" pitchFamily="18" charset="0"/>
               </a:rPr>
-              <a:t>подписки на курсы на платной основе.</a:t>
-            </a:r>
+              <a:t>Монетизация путем интеграции рекламы.</a:t>
+            </a:r>
+            <a:endParaRPr lang="ru-RU" sz="3000" dirty="0">
+              <a:solidFill>
+                <a:schemeClr val="tx1"/>
+              </a:solidFill>
+              <a:effectLst/>
+              <a:latin typeface="Times New Roman" panose="02020603050405020304" pitchFamily="18" charset="0"/>
+              <a:cs typeface="Times New Roman" panose="02020603050405020304" pitchFamily="18" charset="0"/>
+            </a:endParaRPr>
           </a:p>
           <a:p>
             <a:pPr marL="0" indent="0" algn="l">
@@ -9414,21 +8974,21 @@
               </a:rPr>
               <a:t>Добавление системы отзывов с комментариями от пользователей.</a:t>
             </a:r>
+            <a:endParaRPr lang="ru-RU" sz="3000" dirty="0">
+              <a:solidFill>
+                <a:schemeClr val="tx1"/>
+              </a:solidFill>
+              <a:effectLst/>
+              <a:latin typeface="Times New Roman" panose="02020603050405020304" pitchFamily="18" charset="0"/>
+              <a:cs typeface="Times New Roman" panose="02020603050405020304" pitchFamily="18" charset="0"/>
+            </a:endParaRPr>
           </a:p>
         </p:txBody>
       </p:sp>
       <p:cxnSp>
         <p:nvCxnSpPr>
-          <p:cNvPr id="4" name="Прямая соединительная линия 3">
-            <a:extLst>
-              <a:ext uri="{FF2B5EF4-FFF2-40B4-BE49-F238E27FC236}">
-                <a16:creationId xmlns:a16="http://schemas.microsoft.com/office/drawing/2014/main" id="{3D9CC213-1EEE-4BF6-A4E3-03422F68D140}"/>
-              </a:ext>
-            </a:extLst>
-          </p:cNvPr>
-          <p:cNvCxnSpPr>
-            <a:cxnSpLocks/>
-          </p:cNvCxnSpPr>
+          <p:cNvPr id="4" name="Прямая соединительная линия 3"/>
+          <p:cNvCxnSpPr/>
           <p:nvPr/>
         </p:nvCxnSpPr>
         <p:spPr>
@@ -9462,13 +9022,7 @@
       </p:cxnSp>
       <p:sp>
         <p:nvSpPr>
-          <p:cNvPr id="5" name="TextBox 4">
-            <a:extLst>
-              <a:ext uri="{FF2B5EF4-FFF2-40B4-BE49-F238E27FC236}">
-                <a16:creationId xmlns:a16="http://schemas.microsoft.com/office/drawing/2014/main" id="{9300A738-C0FF-416F-91A6-61B855334E64}"/>
-              </a:ext>
-            </a:extLst>
-          </p:cNvPr>
+          <p:cNvPr id="5" name="TextBox 4"/>
           <p:cNvSpPr txBox="1"/>
           <p:nvPr/>
         </p:nvSpPr>
@@ -9511,13 +9065,7 @@
       </p:sp>
       <p:sp>
         <p:nvSpPr>
-          <p:cNvPr id="7" name="Заголовок 6">
-            <a:extLst>
-              <a:ext uri="{FF2B5EF4-FFF2-40B4-BE49-F238E27FC236}">
-                <a16:creationId xmlns:a16="http://schemas.microsoft.com/office/drawing/2014/main" id="{D39146F9-DB10-48EC-8726-07B36B0F4ABE}"/>
-              </a:ext>
-            </a:extLst>
-          </p:cNvPr>
+          <p:cNvPr id="7" name="Заголовок 6"/>
           <p:cNvSpPr>
             <a:spLocks noGrp="1"/>
           </p:cNvSpPr>
@@ -9545,11 +9093,6 @@
         </p:txBody>
       </p:sp>
     </p:spTree>
-    <p:extLst>
-      <p:ext uri="{BB962C8B-B14F-4D97-AF65-F5344CB8AC3E}">
-        <p14:creationId xmlns:p14="http://schemas.microsoft.com/office/powerpoint/2010/main" val="208161284"/>
-      </p:ext>
-    </p:extLst>
   </p:cSld>
   <p:clrMapOvr>
     <a:masterClrMapping/>
@@ -9583,13 +9126,7 @@
       </p:grpSpPr>
       <p:sp>
         <p:nvSpPr>
-          <p:cNvPr id="3" name="Объект 2">
-            <a:extLst>
-              <a:ext uri="{FF2B5EF4-FFF2-40B4-BE49-F238E27FC236}">
-                <a16:creationId xmlns:a16="http://schemas.microsoft.com/office/drawing/2014/main" id="{4725EA8C-002A-46DC-8016-CC59A8B77109}"/>
-              </a:ext>
-            </a:extLst>
-          </p:cNvPr>
+          <p:cNvPr id="3" name="Объект 2"/>
           <p:cNvSpPr>
             <a:spLocks noGrp="1"/>
           </p:cNvSpPr>
@@ -9656,6 +9193,14 @@
               </a:rPr>
               <a:t> разработчик, PM, Дизайнер. </a:t>
             </a:r>
+            <a:endParaRPr lang="ru-RU" sz="2800" dirty="0">
+              <a:solidFill>
+                <a:schemeClr val="tx1"/>
+              </a:solidFill>
+              <a:effectLst/>
+              <a:latin typeface="Times New Roman" panose="02020603050405020304" pitchFamily="18" charset="0"/>
+              <a:cs typeface="Times New Roman" panose="02020603050405020304" pitchFamily="18" charset="0"/>
+            </a:endParaRPr>
           </a:p>
           <a:p>
             <a:pPr marL="0" indent="0" algn="l">
@@ -9705,6 +9250,14 @@
               </a:rPr>
               <a:t> разработчик, Системный аналитик. </a:t>
             </a:r>
+            <a:endParaRPr lang="ru-RU" sz="2800" dirty="0">
+              <a:solidFill>
+                <a:schemeClr val="tx1"/>
+              </a:solidFill>
+              <a:effectLst/>
+              <a:latin typeface="Times New Roman" panose="02020603050405020304" pitchFamily="18" charset="0"/>
+              <a:cs typeface="Times New Roman" panose="02020603050405020304" pitchFamily="18" charset="0"/>
+            </a:endParaRPr>
           </a:p>
           <a:p>
             <a:pPr marL="0" indent="0" algn="l">
@@ -9745,16 +9298,8 @@
       </p:sp>
       <p:cxnSp>
         <p:nvCxnSpPr>
-          <p:cNvPr id="4" name="Прямая соединительная линия 3">
-            <a:extLst>
-              <a:ext uri="{FF2B5EF4-FFF2-40B4-BE49-F238E27FC236}">
-                <a16:creationId xmlns:a16="http://schemas.microsoft.com/office/drawing/2014/main" id="{41AAF543-9918-440F-86EA-1311D868D6FF}"/>
-              </a:ext>
-            </a:extLst>
-          </p:cNvPr>
-          <p:cNvCxnSpPr>
-            <a:cxnSpLocks/>
-          </p:cNvCxnSpPr>
+          <p:cNvPr id="4" name="Прямая соединительная линия 3"/>
+          <p:cNvCxnSpPr/>
           <p:nvPr/>
         </p:nvCxnSpPr>
         <p:spPr>
@@ -9788,13 +9333,7 @@
       </p:cxnSp>
       <p:sp>
         <p:nvSpPr>
-          <p:cNvPr id="5" name="TextBox 4">
-            <a:extLst>
-              <a:ext uri="{FF2B5EF4-FFF2-40B4-BE49-F238E27FC236}">
-                <a16:creationId xmlns:a16="http://schemas.microsoft.com/office/drawing/2014/main" id="{EAC287CD-5305-449D-A76C-53D96109CABF}"/>
-              </a:ext>
-            </a:extLst>
-          </p:cNvPr>
+          <p:cNvPr id="5" name="TextBox 4"/>
           <p:cNvSpPr txBox="1"/>
           <p:nvPr/>
         </p:nvSpPr>
@@ -9837,13 +9376,7 @@
       </p:sp>
       <p:sp>
         <p:nvSpPr>
-          <p:cNvPr id="7" name="Заголовок 6">
-            <a:extLst>
-              <a:ext uri="{FF2B5EF4-FFF2-40B4-BE49-F238E27FC236}">
-                <a16:creationId xmlns:a16="http://schemas.microsoft.com/office/drawing/2014/main" id="{3CDD7094-8BB8-4238-B55D-54EC74E13E69}"/>
-              </a:ext>
-            </a:extLst>
-          </p:cNvPr>
+          <p:cNvPr id="7" name="Заголовок 6"/>
           <p:cNvSpPr>
             <a:spLocks noGrp="1"/>
           </p:cNvSpPr>
@@ -9871,11 +9404,6 @@
         </p:txBody>
       </p:sp>
     </p:spTree>
-    <p:extLst>
-      <p:ext uri="{BB962C8B-B14F-4D97-AF65-F5344CB8AC3E}">
-        <p14:creationId xmlns:p14="http://schemas.microsoft.com/office/powerpoint/2010/main" val="4231576405"/>
-      </p:ext>
-    </p:extLst>
   </p:cSld>
   <p:clrMapOvr>
     <a:masterClrMapping/>
@@ -9933,7 +9461,7 @@
     </a:clrScheme>
     <a:fontScheme name="Сланец">
       <a:majorFont>
-        <a:latin typeface="Calisto MT" panose="02040603050505030304"/>
+        <a:latin typeface="Calisto MT"/>
         <a:ea typeface=""/>
         <a:cs typeface=""/>
         <a:font script="Jpan" typeface="ＭＳ Ｐゴシック"/>
@@ -9968,7 +9496,7 @@
         <a:font script="Geor" typeface="Sylfaen"/>
       </a:majorFont>
       <a:minorFont>
-        <a:latin typeface="Calisto MT" panose="02040603050505030304"/>
+        <a:latin typeface="Calisto MT"/>
         <a:ea typeface=""/>
         <a:cs typeface=""/>
         <a:font script="Jpan" typeface="ＭＳ Ｐゴシック"/>
@@ -10117,16 +9645,16 @@
               </a:schemeClr>
             </a:duotone>
           </a:blip>
-          <a:stretch/>
+          <a:stretch>
+            <a:fillRect/>
+          </a:stretch>
         </a:blipFill>
       </a:bgFillStyleLst>
     </a:fmtScheme>
   </a:themeElements>
-  <a:objectDefaults/>
-  <a:extraClrSchemeLst/>
   <a:extLst>
     <a:ext uri="{05A4C25C-085E-4340-85A3-A5531E510DB2}">
-      <thm15:themeFamily xmlns:thm15="http://schemas.microsoft.com/office/thememl/2012/main" name="Slate" id="{C3F70B94-7CE9-428E-ADC1-3269CC2C3385}" vid="{3F2DE9A5-64E6-437C-A389-CC4477E817E8}"/>
+      <thm15:themeFamily xmlns:thm15="http://schemas.microsoft.com/office/thememl/2012/main" name="Office Theme" id="{62F939B6-93AF-4DB8-9C6B-D6C7DFDC589F}" vid="{4A3C46E8-61CC-4603-A589-7422A47A8E4A}"/>
     </a:ext>
   </a:extLst>
 </a:theme>

</xml_diff>